<commit_message>
Started writing text on the poster
</commit_message>
<xml_diff>
--- a/SESP/SESP-Poster.pptx
+++ b/SESP/SESP-Poster.pptx
@@ -2,7 +2,7 @@
 <file path=ppt/presentation.xml><?xml version="1.0" encoding="utf-8"?>
 <p:presentation xmlns:a="http://schemas.openxmlformats.org/drawingml/2006/main" xmlns:r="http://schemas.openxmlformats.org/officeDocument/2006/relationships" xmlns:p="http://schemas.openxmlformats.org/presentationml/2006/main" saveSubsetFonts="1" autoCompressPictures="0">
   <p:sldMasterIdLst>
-    <p:sldMasterId id="2147483714" r:id="rId1"/>
+    <p:sldMasterId id="2147483858" r:id="rId1"/>
   </p:sldMasterIdLst>
   <p:notesMasterIdLst>
     <p:notesMasterId r:id="rId3"/>
@@ -159,7 +159,7 @@
             </a:lvl1pPr>
           </a:lstStyle>
           <a:p>
-            <a:endParaRPr lang="en-US"/>
+            <a:endParaRPr lang="en-US" dirty="0"/>
           </a:p>
         </p:txBody>
       </p:sp>
@@ -194,7 +194,7 @@
               <a:rPr lang="en-US" smtClean="0"/>
               <a:t>10/20/16</a:t>
             </a:fld>
-            <a:endParaRPr lang="en-US"/>
+            <a:endParaRPr lang="en-US" dirty="0"/>
           </a:p>
         </p:txBody>
       </p:sp>
@@ -227,7 +227,7 @@
           <a:bodyPr vert="horz" lIns="91440" tIns="45720" rIns="91440" bIns="45720" rtlCol="0" anchor="ctr"/>
           <a:lstStyle/>
           <a:p>
-            <a:endParaRPr lang="en-US"/>
+            <a:endParaRPr lang="en-US" dirty="0"/>
           </a:p>
         </p:txBody>
       </p:sp>
@@ -318,7 +318,7 @@
             </a:lvl1pPr>
           </a:lstStyle>
           <a:p>
-            <a:endParaRPr lang="en-US"/>
+            <a:endParaRPr lang="en-US" dirty="0"/>
           </a:p>
         </p:txBody>
       </p:sp>
@@ -353,7 +353,7 @@
               <a:rPr lang="en-US" smtClean="0"/>
               <a:t>‹#›</a:t>
             </a:fld>
-            <a:endParaRPr lang="en-US"/>
+            <a:endParaRPr lang="en-US" dirty="0"/>
           </a:p>
         </p:txBody>
       </p:sp>
@@ -504,7 +504,7 @@
           <a:bodyPr/>
           <a:lstStyle/>
           <a:p>
-            <a:endParaRPr lang="en-US"/>
+            <a:endParaRPr lang="en-US" dirty="0"/>
           </a:p>
         </p:txBody>
       </p:sp>
@@ -527,7 +527,7 @@
               <a:rPr lang="en-US" smtClean="0"/>
               <a:t>1</a:t>
             </a:fld>
-            <a:endParaRPr lang="en-US"/>
+            <a:endParaRPr lang="en-US" dirty="0"/>
           </a:p>
         </p:txBody>
       </p:sp>
@@ -573,15 +573,15 @@
         </p:nvSpPr>
         <p:spPr>
           <a:xfrm>
-            <a:off x="1603772" y="4954765"/>
-            <a:ext cx="18176081" cy="10540259"/>
+            <a:off x="2672953" y="4954765"/>
+            <a:ext cx="16037719" cy="10540259"/>
           </a:xfrm>
         </p:spPr>
         <p:txBody>
           <a:bodyPr anchor="b"/>
           <a:lstStyle>
             <a:lvl1pPr algn="ctr">
-              <a:defRPr sz="14031"/>
+              <a:defRPr sz="10523"/>
             </a:lvl1pPr>
           </a:lstStyle>
           <a:p>
@@ -589,7 +589,7 @@
               <a:rPr lang="en-US" smtClean="0"/>
               <a:t>Click to edit Master title style</a:t>
             </a:r>
-            <a:endParaRPr lang="en-US" dirty="0"/>
+            <a:endParaRPr lang="en-US"/>
           </a:p>
         </p:txBody>
       </p:sp>
@@ -614,39 +614,39 @@
           <a:lstStyle>
             <a:lvl1pPr marL="0" indent="0" algn="ctr">
               <a:buNone/>
-              <a:defRPr sz="5612"/>
+              <a:defRPr sz="4209"/>
             </a:lvl1pPr>
-            <a:lvl2pPr marL="1069162" indent="0" algn="ctr">
-              <a:buNone/>
-              <a:defRPr sz="4677"/>
+            <a:lvl2pPr marL="801883" indent="0" algn="ctr">
+              <a:buNone/>
+              <a:defRPr sz="3508"/>
             </a:lvl2pPr>
-            <a:lvl3pPr marL="2138324" indent="0" algn="ctr">
-              <a:buNone/>
-              <a:defRPr sz="4209"/>
+            <a:lvl3pPr marL="1603766" indent="0" algn="ctr">
+              <a:buNone/>
+              <a:defRPr sz="3157"/>
             </a:lvl3pPr>
-            <a:lvl4pPr marL="3207487" indent="0" algn="ctr">
-              <a:buNone/>
-              <a:defRPr sz="3742"/>
+            <a:lvl4pPr marL="2405649" indent="0" algn="ctr">
+              <a:buNone/>
+              <a:defRPr sz="2806"/>
             </a:lvl4pPr>
-            <a:lvl5pPr marL="4276649" indent="0" algn="ctr">
-              <a:buNone/>
-              <a:defRPr sz="3742"/>
+            <a:lvl5pPr marL="3207532" indent="0" algn="ctr">
+              <a:buNone/>
+              <a:defRPr sz="2806"/>
             </a:lvl5pPr>
-            <a:lvl6pPr marL="5345811" indent="0" algn="ctr">
-              <a:buNone/>
-              <a:defRPr sz="3742"/>
+            <a:lvl6pPr marL="4009415" indent="0" algn="ctr">
+              <a:buNone/>
+              <a:defRPr sz="2806"/>
             </a:lvl6pPr>
-            <a:lvl7pPr marL="6414973" indent="0" algn="ctr">
-              <a:buNone/>
-              <a:defRPr sz="3742"/>
+            <a:lvl7pPr marL="4811298" indent="0" algn="ctr">
+              <a:buNone/>
+              <a:defRPr sz="2806"/>
             </a:lvl7pPr>
-            <a:lvl8pPr marL="7484135" indent="0" algn="ctr">
-              <a:buNone/>
-              <a:defRPr sz="3742"/>
+            <a:lvl8pPr marL="5613182" indent="0" algn="ctr">
+              <a:buNone/>
+              <a:defRPr sz="2806"/>
             </a:lvl8pPr>
-            <a:lvl9pPr marL="8553298" indent="0" algn="ctr">
-              <a:buNone/>
-              <a:defRPr sz="3742"/>
+            <a:lvl9pPr marL="6415065" indent="0" algn="ctr">
+              <a:buNone/>
+              <a:defRPr sz="2806"/>
             </a:lvl9pPr>
           </a:lstStyle>
           <a:p>
@@ -654,7 +654,7 @@
               <a:rPr lang="en-US" smtClean="0"/>
               <a:t>Click to edit Master subtitle style</a:t>
             </a:r>
-            <a:endParaRPr lang="en-US" dirty="0"/>
+            <a:endParaRPr lang="en-US"/>
           </a:p>
         </p:txBody>
       </p:sp>
@@ -677,7 +677,7 @@
               <a:rPr lang="en-US" smtClean="0"/>
               <a:t>10/20/16</a:t>
             </a:fld>
-            <a:endParaRPr lang="en-US"/>
+            <a:endParaRPr lang="en-US" dirty="0"/>
           </a:p>
         </p:txBody>
       </p:sp>
@@ -696,7 +696,7 @@
           <a:bodyPr/>
           <a:lstStyle/>
           <a:p>
-            <a:endParaRPr lang="en-US"/>
+            <a:endParaRPr lang="en-US" dirty="0"/>
           </a:p>
         </p:txBody>
       </p:sp>
@@ -719,14 +719,14 @@
               <a:rPr lang="en-US" smtClean="0"/>
               <a:t>‹#›</a:t>
             </a:fld>
-            <a:endParaRPr lang="en-US"/>
+            <a:endParaRPr lang="en-US" dirty="0"/>
           </a:p>
         </p:txBody>
       </p:sp>
     </p:spTree>
     <p:extLst>
       <p:ext uri="{BB962C8B-B14F-4D97-AF65-F5344CB8AC3E}">
-        <p14:creationId xmlns:p14="http://schemas.microsoft.com/office/powerpoint/2010/main" val="274646184"/>
+        <p14:creationId xmlns:p14="http://schemas.microsoft.com/office/powerpoint/2010/main" val="1440341613"/>
       </p:ext>
     </p:extLst>
   </p:cSld>
@@ -772,7 +772,7 @@
               <a:rPr lang="en-US" smtClean="0"/>
               <a:t>Click to edit Master title style</a:t>
             </a:r>
-            <a:endParaRPr lang="en-US" dirty="0"/>
+            <a:endParaRPr lang="en-US"/>
           </a:p>
         </p:txBody>
       </p:sp>
@@ -824,7 +824,7 @@
               <a:rPr lang="en-US" smtClean="0"/>
               <a:t>Fifth level</a:t>
             </a:r>
-            <a:endParaRPr lang="en-US" dirty="0"/>
+            <a:endParaRPr lang="en-US"/>
           </a:p>
         </p:txBody>
       </p:sp>
@@ -847,7 +847,7 @@
               <a:rPr lang="en-US" smtClean="0"/>
               <a:t>10/20/16</a:t>
             </a:fld>
-            <a:endParaRPr lang="en-US"/>
+            <a:endParaRPr lang="en-US" dirty="0"/>
           </a:p>
         </p:txBody>
       </p:sp>
@@ -866,7 +866,7 @@
           <a:bodyPr/>
           <a:lstStyle/>
           <a:p>
-            <a:endParaRPr lang="en-US"/>
+            <a:endParaRPr lang="en-US" dirty="0"/>
           </a:p>
         </p:txBody>
       </p:sp>
@@ -889,14 +889,14 @@
               <a:rPr lang="en-US" smtClean="0"/>
               <a:t>‹#›</a:t>
             </a:fld>
-            <a:endParaRPr lang="en-US"/>
+            <a:endParaRPr lang="en-US" dirty="0"/>
           </a:p>
         </p:txBody>
       </p:sp>
     </p:spTree>
     <p:extLst>
       <p:ext uri="{BB962C8B-B14F-4D97-AF65-F5344CB8AC3E}">
-        <p14:creationId xmlns:p14="http://schemas.microsoft.com/office/powerpoint/2010/main" val="1434392077"/>
+        <p14:creationId xmlns:p14="http://schemas.microsoft.com/office/powerpoint/2010/main" val="1906554439"/>
       </p:ext>
     </p:extLst>
   </p:cSld>
@@ -935,7 +935,7 @@
         </p:nvSpPr>
         <p:spPr>
           <a:xfrm>
-            <a:off x="15302658" y="1611875"/>
+            <a:off x="15302657" y="1611875"/>
             <a:ext cx="4610844" cy="25656844"/>
           </a:xfrm>
         </p:spPr>
@@ -947,7 +947,7 @@
               <a:rPr lang="en-US" smtClean="0"/>
               <a:t>Click to edit Master title style</a:t>
             </a:r>
-            <a:endParaRPr lang="en-US" dirty="0"/>
+            <a:endParaRPr lang="en-US"/>
           </a:p>
         </p:txBody>
       </p:sp>
@@ -963,7 +963,7 @@
         </p:nvSpPr>
         <p:spPr>
           <a:xfrm>
-            <a:off x="1470125" y="1611875"/>
+            <a:off x="1470124" y="1611875"/>
             <a:ext cx="13565237" cy="25656844"/>
           </a:xfrm>
         </p:spPr>
@@ -1004,7 +1004,7 @@
               <a:rPr lang="en-US" smtClean="0"/>
               <a:t>Fifth level</a:t>
             </a:r>
-            <a:endParaRPr lang="en-US" dirty="0"/>
+            <a:endParaRPr lang="en-US"/>
           </a:p>
         </p:txBody>
       </p:sp>
@@ -1027,7 +1027,7 @@
               <a:rPr lang="en-US" smtClean="0"/>
               <a:t>10/20/16</a:t>
             </a:fld>
-            <a:endParaRPr lang="en-US"/>
+            <a:endParaRPr lang="en-US" dirty="0"/>
           </a:p>
         </p:txBody>
       </p:sp>
@@ -1046,7 +1046,7 @@
           <a:bodyPr/>
           <a:lstStyle/>
           <a:p>
-            <a:endParaRPr lang="en-US"/>
+            <a:endParaRPr lang="en-US" dirty="0"/>
           </a:p>
         </p:txBody>
       </p:sp>
@@ -1069,14 +1069,14 @@
               <a:rPr lang="en-US" smtClean="0"/>
               <a:t>‹#›</a:t>
             </a:fld>
-            <a:endParaRPr lang="en-US"/>
+            <a:endParaRPr lang="en-US" dirty="0"/>
           </a:p>
         </p:txBody>
       </p:sp>
     </p:spTree>
     <p:extLst>
       <p:ext uri="{BB962C8B-B14F-4D97-AF65-F5344CB8AC3E}">
-        <p14:creationId xmlns:p14="http://schemas.microsoft.com/office/powerpoint/2010/main" val="176216917"/>
+        <p14:creationId xmlns:p14="http://schemas.microsoft.com/office/powerpoint/2010/main" val="856959386"/>
       </p:ext>
     </p:extLst>
   </p:cSld>
@@ -1122,7 +1122,7 @@
               <a:rPr lang="en-US" smtClean="0"/>
               <a:t>Click to edit Master title style</a:t>
             </a:r>
-            <a:endParaRPr lang="en-US" dirty="0"/>
+            <a:endParaRPr lang="en-US"/>
           </a:p>
         </p:txBody>
       </p:sp>
@@ -1174,7 +1174,7 @@
               <a:rPr lang="en-US" smtClean="0"/>
               <a:t>Fifth level</a:t>
             </a:r>
-            <a:endParaRPr lang="en-US" dirty="0"/>
+            <a:endParaRPr lang="en-US"/>
           </a:p>
         </p:txBody>
       </p:sp>
@@ -1197,7 +1197,7 @@
               <a:rPr lang="en-US" smtClean="0"/>
               <a:t>10/20/16</a:t>
             </a:fld>
-            <a:endParaRPr lang="en-US"/>
+            <a:endParaRPr lang="en-US" dirty="0"/>
           </a:p>
         </p:txBody>
       </p:sp>
@@ -1216,7 +1216,7 @@
           <a:bodyPr/>
           <a:lstStyle/>
           <a:p>
-            <a:endParaRPr lang="en-US"/>
+            <a:endParaRPr lang="en-US" dirty="0"/>
           </a:p>
         </p:txBody>
       </p:sp>
@@ -1239,14 +1239,14 @@
               <a:rPr lang="en-US" smtClean="0"/>
               <a:t>‹#›</a:t>
             </a:fld>
-            <a:endParaRPr lang="en-US"/>
+            <a:endParaRPr lang="en-US" dirty="0"/>
           </a:p>
         </p:txBody>
       </p:sp>
     </p:spTree>
     <p:extLst>
       <p:ext uri="{BB962C8B-B14F-4D97-AF65-F5344CB8AC3E}">
-        <p14:creationId xmlns:p14="http://schemas.microsoft.com/office/powerpoint/2010/main" val="1036057085"/>
+        <p14:creationId xmlns:p14="http://schemas.microsoft.com/office/powerpoint/2010/main" val="1385820707"/>
       </p:ext>
     </p:extLst>
   </p:cSld>
@@ -1285,7 +1285,7 @@
         </p:nvSpPr>
         <p:spPr>
           <a:xfrm>
-            <a:off x="1458988" y="7547788"/>
+            <a:off x="1458987" y="7547783"/>
             <a:ext cx="18443377" cy="12593645"/>
           </a:xfrm>
         </p:spPr>
@@ -1293,7 +1293,7 @@
           <a:bodyPr anchor="b"/>
           <a:lstStyle>
             <a:lvl1pPr>
-              <a:defRPr sz="14031"/>
+              <a:defRPr sz="10523"/>
             </a:lvl1pPr>
           </a:lstStyle>
           <a:p>
@@ -1301,7 +1301,7 @@
               <a:rPr lang="en-US" smtClean="0"/>
               <a:t>Click to edit Master title style</a:t>
             </a:r>
-            <a:endParaRPr lang="en-US" dirty="0"/>
+            <a:endParaRPr lang="en-US"/>
           </a:p>
         </p:txBody>
       </p:sp>
@@ -1317,7 +1317,7 @@
         </p:nvSpPr>
         <p:spPr>
           <a:xfrm>
-            <a:off x="1458988" y="20260574"/>
+            <a:off x="1458987" y="20260569"/>
             <a:ext cx="18443377" cy="6622701"/>
           </a:xfrm>
         </p:spPr>
@@ -1326,15 +1326,17 @@
           <a:lstStyle>
             <a:lvl1pPr marL="0" indent="0">
               <a:buNone/>
-              <a:defRPr sz="5612">
+              <a:defRPr sz="4209">
                 <a:solidFill>
-                  <a:schemeClr val="tx1"/>
+                  <a:schemeClr val="tx1">
+                    <a:tint val="75000"/>
+                  </a:schemeClr>
                 </a:solidFill>
               </a:defRPr>
             </a:lvl1pPr>
-            <a:lvl2pPr marL="1069162" indent="0">
-              <a:buNone/>
-              <a:defRPr sz="4677">
+            <a:lvl2pPr marL="801883" indent="0">
+              <a:buNone/>
+              <a:defRPr sz="3508">
                 <a:solidFill>
                   <a:schemeClr val="tx1">
                     <a:tint val="75000"/>
@@ -1342,9 +1344,9 @@
                 </a:solidFill>
               </a:defRPr>
             </a:lvl2pPr>
-            <a:lvl3pPr marL="2138324" indent="0">
-              <a:buNone/>
-              <a:defRPr sz="4209">
+            <a:lvl3pPr marL="1603766" indent="0">
+              <a:buNone/>
+              <a:defRPr sz="3157">
                 <a:solidFill>
                   <a:schemeClr val="tx1">
                     <a:tint val="75000"/>
@@ -1352,9 +1354,9 @@
                 </a:solidFill>
               </a:defRPr>
             </a:lvl3pPr>
-            <a:lvl4pPr marL="3207487" indent="0">
-              <a:buNone/>
-              <a:defRPr sz="3742">
+            <a:lvl4pPr marL="2405649" indent="0">
+              <a:buNone/>
+              <a:defRPr sz="2806">
                 <a:solidFill>
                   <a:schemeClr val="tx1">
                     <a:tint val="75000"/>
@@ -1362,9 +1364,9 @@
                 </a:solidFill>
               </a:defRPr>
             </a:lvl4pPr>
-            <a:lvl5pPr marL="4276649" indent="0">
-              <a:buNone/>
-              <a:defRPr sz="3742">
+            <a:lvl5pPr marL="3207532" indent="0">
+              <a:buNone/>
+              <a:defRPr sz="2806">
                 <a:solidFill>
                   <a:schemeClr val="tx1">
                     <a:tint val="75000"/>
@@ -1372,9 +1374,9 @@
                 </a:solidFill>
               </a:defRPr>
             </a:lvl5pPr>
-            <a:lvl6pPr marL="5345811" indent="0">
-              <a:buNone/>
-              <a:defRPr sz="3742">
+            <a:lvl6pPr marL="4009415" indent="0">
+              <a:buNone/>
+              <a:defRPr sz="2806">
                 <a:solidFill>
                   <a:schemeClr val="tx1">
                     <a:tint val="75000"/>
@@ -1382,9 +1384,9 @@
                 </a:solidFill>
               </a:defRPr>
             </a:lvl6pPr>
-            <a:lvl7pPr marL="6414973" indent="0">
-              <a:buNone/>
-              <a:defRPr sz="3742">
+            <a:lvl7pPr marL="4811298" indent="0">
+              <a:buNone/>
+              <a:defRPr sz="2806">
                 <a:solidFill>
                   <a:schemeClr val="tx1">
                     <a:tint val="75000"/>
@@ -1392,9 +1394,9 @@
                 </a:solidFill>
               </a:defRPr>
             </a:lvl7pPr>
-            <a:lvl8pPr marL="7484135" indent="0">
-              <a:buNone/>
-              <a:defRPr sz="3742">
+            <a:lvl8pPr marL="5613182" indent="0">
+              <a:buNone/>
+              <a:defRPr sz="2806">
                 <a:solidFill>
                   <a:schemeClr val="tx1">
                     <a:tint val="75000"/>
@@ -1402,9 +1404,9 @@
                 </a:solidFill>
               </a:defRPr>
             </a:lvl8pPr>
-            <a:lvl9pPr marL="8553298" indent="0">
-              <a:buNone/>
-              <a:defRPr sz="3742">
+            <a:lvl9pPr marL="6415065" indent="0">
+              <a:buNone/>
+              <a:defRPr sz="2806">
                 <a:solidFill>
                   <a:schemeClr val="tx1">
                     <a:tint val="75000"/>
@@ -1441,7 +1443,7 @@
               <a:rPr lang="en-US" smtClean="0"/>
               <a:t>10/20/16</a:t>
             </a:fld>
-            <a:endParaRPr lang="en-US"/>
+            <a:endParaRPr lang="en-US" dirty="0"/>
           </a:p>
         </p:txBody>
       </p:sp>
@@ -1460,7 +1462,7 @@
           <a:bodyPr/>
           <a:lstStyle/>
           <a:p>
-            <a:endParaRPr lang="en-US"/>
+            <a:endParaRPr lang="en-US" dirty="0"/>
           </a:p>
         </p:txBody>
       </p:sp>
@@ -1483,14 +1485,14 @@
               <a:rPr lang="en-US" smtClean="0"/>
               <a:t>‹#›</a:t>
             </a:fld>
-            <a:endParaRPr lang="en-US"/>
+            <a:endParaRPr lang="en-US" dirty="0"/>
           </a:p>
         </p:txBody>
       </p:sp>
     </p:spTree>
     <p:extLst>
       <p:ext uri="{BB962C8B-B14F-4D97-AF65-F5344CB8AC3E}">
-        <p14:creationId xmlns:p14="http://schemas.microsoft.com/office/powerpoint/2010/main" val="1214017719"/>
+        <p14:creationId xmlns:p14="http://schemas.microsoft.com/office/powerpoint/2010/main" val="2028470834"/>
       </p:ext>
     </p:extLst>
   </p:cSld>
@@ -1536,7 +1538,7 @@
               <a:rPr lang="en-US" smtClean="0"/>
               <a:t>Click to edit Master title style</a:t>
             </a:r>
-            <a:endParaRPr lang="en-US" dirty="0"/>
+            <a:endParaRPr lang="en-US"/>
           </a:p>
         </p:txBody>
       </p:sp>
@@ -1593,7 +1595,7 @@
               <a:rPr lang="en-US" smtClean="0"/>
               <a:t>Fifth level</a:t>
             </a:r>
-            <a:endParaRPr lang="en-US" dirty="0"/>
+            <a:endParaRPr lang="en-US"/>
           </a:p>
         </p:txBody>
       </p:sp>
@@ -1650,7 +1652,7 @@
               <a:rPr lang="en-US" smtClean="0"/>
               <a:t>Fifth level</a:t>
             </a:r>
-            <a:endParaRPr lang="en-US" dirty="0"/>
+            <a:endParaRPr lang="en-US"/>
           </a:p>
         </p:txBody>
       </p:sp>
@@ -1673,7 +1675,7 @@
               <a:rPr lang="en-US" smtClean="0"/>
               <a:t>10/20/16</a:t>
             </a:fld>
-            <a:endParaRPr lang="en-US"/>
+            <a:endParaRPr lang="en-US" dirty="0"/>
           </a:p>
         </p:txBody>
       </p:sp>
@@ -1692,7 +1694,7 @@
           <a:bodyPr/>
           <a:lstStyle/>
           <a:p>
-            <a:endParaRPr lang="en-US"/>
+            <a:endParaRPr lang="en-US" dirty="0"/>
           </a:p>
         </p:txBody>
       </p:sp>
@@ -1715,20 +1717,25 @@
               <a:rPr lang="en-US" smtClean="0"/>
               <a:t>‹#›</a:t>
             </a:fld>
-            <a:endParaRPr lang="en-US"/>
+            <a:endParaRPr lang="en-US" dirty="0"/>
           </a:p>
         </p:txBody>
       </p:sp>
     </p:spTree>
     <p:extLst>
       <p:ext uri="{BB962C8B-B14F-4D97-AF65-F5344CB8AC3E}">
-        <p14:creationId xmlns:p14="http://schemas.microsoft.com/office/powerpoint/2010/main" val="753673086"/>
+        <p14:creationId xmlns:p14="http://schemas.microsoft.com/office/powerpoint/2010/main" val="1206410913"/>
       </p:ext>
     </p:extLst>
   </p:cSld>
   <p:clrMapOvr>
     <a:masterClrMapping/>
   </p:clrMapOvr>
+  <p:extLst>
+    <p:ext uri="{DCECCB84-F9BA-43D5-87BE-67443E8EF086}">
+      <p15:sldGuideLst xmlns:p15="http://schemas.microsoft.com/office/powerpoint/2012/main"/>
+    </p:ext>
+  </p:extLst>
 </p:sldLayout>
 </file>
 
@@ -1761,7 +1768,7 @@
         </p:nvSpPr>
         <p:spPr>
           <a:xfrm>
-            <a:off x="1472909" y="1611882"/>
+            <a:off x="1472909" y="1611877"/>
             <a:ext cx="18443377" cy="5851808"/>
           </a:xfrm>
         </p:spPr>
@@ -1773,7 +1780,7 @@
               <a:rPr lang="en-US" smtClean="0"/>
               <a:t>Click to edit Master title style</a:t>
             </a:r>
-            <a:endParaRPr lang="en-US" dirty="0"/>
+            <a:endParaRPr lang="en-US"/>
           </a:p>
         </p:txBody>
       </p:sp>
@@ -1789,8 +1796,8 @@
         </p:nvSpPr>
         <p:spPr>
           <a:xfrm>
-            <a:off x="1472912" y="7421634"/>
-            <a:ext cx="9046274" cy="3637228"/>
+            <a:off x="1472910" y="7421634"/>
+            <a:ext cx="9046275" cy="3637228"/>
           </a:xfrm>
         </p:spPr>
         <p:txBody>
@@ -1798,39 +1805,39 @@
           <a:lstStyle>
             <a:lvl1pPr marL="0" indent="0">
               <a:buNone/>
-              <a:defRPr sz="5612" b="1"/>
+              <a:defRPr sz="4209" b="1"/>
             </a:lvl1pPr>
-            <a:lvl2pPr marL="1069162" indent="0">
-              <a:buNone/>
-              <a:defRPr sz="4677" b="1"/>
+            <a:lvl2pPr marL="801883" indent="0">
+              <a:buNone/>
+              <a:defRPr sz="3508" b="1"/>
             </a:lvl2pPr>
-            <a:lvl3pPr marL="2138324" indent="0">
-              <a:buNone/>
-              <a:defRPr sz="4209" b="1"/>
+            <a:lvl3pPr marL="1603766" indent="0">
+              <a:buNone/>
+              <a:defRPr sz="3157" b="1"/>
             </a:lvl3pPr>
-            <a:lvl4pPr marL="3207487" indent="0">
-              <a:buNone/>
-              <a:defRPr sz="3742" b="1"/>
+            <a:lvl4pPr marL="2405649" indent="0">
+              <a:buNone/>
+              <a:defRPr sz="2806" b="1"/>
             </a:lvl4pPr>
-            <a:lvl5pPr marL="4276649" indent="0">
-              <a:buNone/>
-              <a:defRPr sz="3742" b="1"/>
+            <a:lvl5pPr marL="3207532" indent="0">
+              <a:buNone/>
+              <a:defRPr sz="2806" b="1"/>
             </a:lvl5pPr>
-            <a:lvl6pPr marL="5345811" indent="0">
-              <a:buNone/>
-              <a:defRPr sz="3742" b="1"/>
+            <a:lvl6pPr marL="4009415" indent="0">
+              <a:buNone/>
+              <a:defRPr sz="2806" b="1"/>
             </a:lvl6pPr>
-            <a:lvl7pPr marL="6414973" indent="0">
-              <a:buNone/>
-              <a:defRPr sz="3742" b="1"/>
+            <a:lvl7pPr marL="4811298" indent="0">
+              <a:buNone/>
+              <a:defRPr sz="2806" b="1"/>
             </a:lvl7pPr>
-            <a:lvl8pPr marL="7484135" indent="0">
-              <a:buNone/>
-              <a:defRPr sz="3742" b="1"/>
+            <a:lvl8pPr marL="5613182" indent="0">
+              <a:buNone/>
+              <a:defRPr sz="2806" b="1"/>
             </a:lvl8pPr>
-            <a:lvl9pPr marL="8553298" indent="0">
-              <a:buNone/>
-              <a:defRPr sz="3742" b="1"/>
+            <a:lvl9pPr marL="6415065" indent="0">
+              <a:buNone/>
+              <a:defRPr sz="2806" b="1"/>
             </a:lvl9pPr>
           </a:lstStyle>
           <a:p>
@@ -1854,8 +1861,8 @@
         </p:nvSpPr>
         <p:spPr>
           <a:xfrm>
-            <a:off x="1472912" y="11058863"/>
-            <a:ext cx="9046274" cy="16265921"/>
+            <a:off x="1472910" y="11058863"/>
+            <a:ext cx="9046275" cy="16265921"/>
           </a:xfrm>
         </p:spPr>
         <p:txBody>
@@ -1895,7 +1902,7 @@
               <a:rPr lang="en-US" smtClean="0"/>
               <a:t>Fifth level</a:t>
             </a:r>
-            <a:endParaRPr lang="en-US" dirty="0"/>
+            <a:endParaRPr lang="en-US"/>
           </a:p>
         </p:txBody>
       </p:sp>
@@ -1911,7 +1918,7 @@
         </p:nvSpPr>
         <p:spPr>
           <a:xfrm>
-            <a:off x="10825461" y="7421634"/>
+            <a:off x="10825460" y="7421634"/>
             <a:ext cx="9090826" cy="3637228"/>
           </a:xfrm>
         </p:spPr>
@@ -1920,39 +1927,39 @@
           <a:lstStyle>
             <a:lvl1pPr marL="0" indent="0">
               <a:buNone/>
-              <a:defRPr sz="5612" b="1"/>
+              <a:defRPr sz="4209" b="1"/>
             </a:lvl1pPr>
-            <a:lvl2pPr marL="1069162" indent="0">
-              <a:buNone/>
-              <a:defRPr sz="4677" b="1"/>
+            <a:lvl2pPr marL="801883" indent="0">
+              <a:buNone/>
+              <a:defRPr sz="3508" b="1"/>
             </a:lvl2pPr>
-            <a:lvl3pPr marL="2138324" indent="0">
-              <a:buNone/>
-              <a:defRPr sz="4209" b="1"/>
+            <a:lvl3pPr marL="1603766" indent="0">
+              <a:buNone/>
+              <a:defRPr sz="3157" b="1"/>
             </a:lvl3pPr>
-            <a:lvl4pPr marL="3207487" indent="0">
-              <a:buNone/>
-              <a:defRPr sz="3742" b="1"/>
+            <a:lvl4pPr marL="2405649" indent="0">
+              <a:buNone/>
+              <a:defRPr sz="2806" b="1"/>
             </a:lvl4pPr>
-            <a:lvl5pPr marL="4276649" indent="0">
-              <a:buNone/>
-              <a:defRPr sz="3742" b="1"/>
+            <a:lvl5pPr marL="3207532" indent="0">
+              <a:buNone/>
+              <a:defRPr sz="2806" b="1"/>
             </a:lvl5pPr>
-            <a:lvl6pPr marL="5345811" indent="0">
-              <a:buNone/>
-              <a:defRPr sz="3742" b="1"/>
+            <a:lvl6pPr marL="4009415" indent="0">
+              <a:buNone/>
+              <a:defRPr sz="2806" b="1"/>
             </a:lvl6pPr>
-            <a:lvl7pPr marL="6414973" indent="0">
-              <a:buNone/>
-              <a:defRPr sz="3742" b="1"/>
+            <a:lvl7pPr marL="4811298" indent="0">
+              <a:buNone/>
+              <a:defRPr sz="2806" b="1"/>
             </a:lvl7pPr>
-            <a:lvl8pPr marL="7484135" indent="0">
-              <a:buNone/>
-              <a:defRPr sz="3742" b="1"/>
+            <a:lvl8pPr marL="5613182" indent="0">
+              <a:buNone/>
+              <a:defRPr sz="2806" b="1"/>
             </a:lvl8pPr>
-            <a:lvl9pPr marL="8553298" indent="0">
-              <a:buNone/>
-              <a:defRPr sz="3742" b="1"/>
+            <a:lvl9pPr marL="6415065" indent="0">
+              <a:buNone/>
+              <a:defRPr sz="2806" b="1"/>
             </a:lvl9pPr>
           </a:lstStyle>
           <a:p>
@@ -1976,7 +1983,7 @@
         </p:nvSpPr>
         <p:spPr>
           <a:xfrm>
-            <a:off x="10825461" y="11058863"/>
+            <a:off x="10825460" y="11058863"/>
             <a:ext cx="9090826" cy="16265921"/>
           </a:xfrm>
         </p:spPr>
@@ -2017,7 +2024,7 @@
               <a:rPr lang="en-US" smtClean="0"/>
               <a:t>Fifth level</a:t>
             </a:r>
-            <a:endParaRPr lang="en-US" dirty="0"/>
+            <a:endParaRPr lang="en-US"/>
           </a:p>
         </p:txBody>
       </p:sp>
@@ -2040,7 +2047,7 @@
               <a:rPr lang="en-US" smtClean="0"/>
               <a:t>10/20/16</a:t>
             </a:fld>
-            <a:endParaRPr lang="en-US"/>
+            <a:endParaRPr lang="en-US" dirty="0"/>
           </a:p>
         </p:txBody>
       </p:sp>
@@ -2059,7 +2066,7 @@
           <a:bodyPr/>
           <a:lstStyle/>
           <a:p>
-            <a:endParaRPr lang="en-US"/>
+            <a:endParaRPr lang="en-US" dirty="0"/>
           </a:p>
         </p:txBody>
       </p:sp>
@@ -2082,20 +2089,25 @@
               <a:rPr lang="en-US" smtClean="0"/>
               <a:t>‹#›</a:t>
             </a:fld>
-            <a:endParaRPr lang="en-US"/>
+            <a:endParaRPr lang="en-US" dirty="0"/>
           </a:p>
         </p:txBody>
       </p:sp>
     </p:spTree>
     <p:extLst>
       <p:ext uri="{BB962C8B-B14F-4D97-AF65-F5344CB8AC3E}">
-        <p14:creationId xmlns:p14="http://schemas.microsoft.com/office/powerpoint/2010/main" val="1125006396"/>
+        <p14:creationId xmlns:p14="http://schemas.microsoft.com/office/powerpoint/2010/main" val="1755103464"/>
       </p:ext>
     </p:extLst>
   </p:cSld>
   <p:clrMapOvr>
     <a:masterClrMapping/>
   </p:clrMapOvr>
+  <p:extLst>
+    <p:ext uri="{DCECCB84-F9BA-43D5-87BE-67443E8EF086}">
+      <p15:sldGuideLst xmlns:p15="http://schemas.microsoft.com/office/powerpoint/2012/main"/>
+    </p:ext>
+  </p:extLst>
 </p:sldLayout>
 </file>
 
@@ -2135,7 +2147,7 @@
               <a:rPr lang="en-US" smtClean="0"/>
               <a:t>Click to edit Master title style</a:t>
             </a:r>
-            <a:endParaRPr lang="en-US" dirty="0"/>
+            <a:endParaRPr lang="en-US"/>
           </a:p>
         </p:txBody>
       </p:sp>
@@ -2158,7 +2170,7 @@
               <a:rPr lang="en-US" smtClean="0"/>
               <a:t>10/20/16</a:t>
             </a:fld>
-            <a:endParaRPr lang="en-US"/>
+            <a:endParaRPr lang="en-US" dirty="0"/>
           </a:p>
         </p:txBody>
       </p:sp>
@@ -2177,7 +2189,7 @@
           <a:bodyPr/>
           <a:lstStyle/>
           <a:p>
-            <a:endParaRPr lang="en-US"/>
+            <a:endParaRPr lang="en-US" dirty="0"/>
           </a:p>
         </p:txBody>
       </p:sp>
@@ -2200,14 +2212,14 @@
               <a:rPr lang="en-US" smtClean="0"/>
               <a:t>‹#›</a:t>
             </a:fld>
-            <a:endParaRPr lang="en-US"/>
+            <a:endParaRPr lang="en-US" dirty="0"/>
           </a:p>
         </p:txBody>
       </p:sp>
     </p:spTree>
     <p:extLst>
       <p:ext uri="{BB962C8B-B14F-4D97-AF65-F5344CB8AC3E}">
-        <p14:creationId xmlns:p14="http://schemas.microsoft.com/office/powerpoint/2010/main" val="1536469384"/>
+        <p14:creationId xmlns:p14="http://schemas.microsoft.com/office/powerpoint/2010/main" val="188544256"/>
       </p:ext>
     </p:extLst>
   </p:cSld>
@@ -2253,7 +2265,7 @@
               <a:rPr lang="en-US" smtClean="0"/>
               <a:t>10/20/16</a:t>
             </a:fld>
-            <a:endParaRPr lang="en-US"/>
+            <a:endParaRPr lang="en-US" dirty="0"/>
           </a:p>
         </p:txBody>
       </p:sp>
@@ -2272,7 +2284,7 @@
           <a:bodyPr/>
           <a:lstStyle/>
           <a:p>
-            <a:endParaRPr lang="en-US"/>
+            <a:endParaRPr lang="en-US" dirty="0"/>
           </a:p>
         </p:txBody>
       </p:sp>
@@ -2295,14 +2307,14 @@
               <a:rPr lang="en-US" smtClean="0"/>
               <a:t>‹#›</a:t>
             </a:fld>
-            <a:endParaRPr lang="en-US"/>
+            <a:endParaRPr lang="en-US" dirty="0"/>
           </a:p>
         </p:txBody>
       </p:sp>
     </p:spTree>
     <p:extLst>
       <p:ext uri="{BB962C8B-B14F-4D97-AF65-F5344CB8AC3E}">
-        <p14:creationId xmlns:p14="http://schemas.microsoft.com/office/powerpoint/2010/main" val="2097565360"/>
+        <p14:creationId xmlns:p14="http://schemas.microsoft.com/office/powerpoint/2010/main" val="1324931267"/>
       </p:ext>
     </p:extLst>
   </p:cSld>
@@ -2341,15 +2353,15 @@
         </p:nvSpPr>
         <p:spPr>
           <a:xfrm>
-            <a:off x="1472909" y="2018348"/>
-            <a:ext cx="6896776" cy="7064216"/>
+            <a:off x="1472910" y="2018348"/>
+            <a:ext cx="6896775" cy="7064216"/>
           </a:xfrm>
         </p:spPr>
         <p:txBody>
           <a:bodyPr anchor="b"/>
           <a:lstStyle>
             <a:lvl1pPr>
-              <a:defRPr sz="7483"/>
+              <a:defRPr sz="5612"/>
             </a:lvl1pPr>
           </a:lstStyle>
           <a:p>
@@ -2357,7 +2369,7 @@
               <a:rPr lang="en-US" smtClean="0"/>
               <a:t>Click to edit Master title style</a:t>
             </a:r>
-            <a:endParaRPr lang="en-US" dirty="0"/>
+            <a:endParaRPr lang="en-US"/>
           </a:p>
         </p:txBody>
       </p:sp>
@@ -2373,7 +2385,7 @@
         </p:nvSpPr>
         <p:spPr>
           <a:xfrm>
-            <a:off x="9090826" y="4359077"/>
+            <a:off x="9090826" y="4359072"/>
             <a:ext cx="10825460" cy="21515024"/>
           </a:xfrm>
         </p:spPr>
@@ -2381,31 +2393,31 @@
           <a:bodyPr/>
           <a:lstStyle>
             <a:lvl1pPr>
-              <a:defRPr sz="7483"/>
+              <a:defRPr sz="5612"/>
             </a:lvl1pPr>
             <a:lvl2pPr>
-              <a:defRPr sz="6548"/>
+              <a:defRPr sz="4911"/>
             </a:lvl2pPr>
             <a:lvl3pPr>
-              <a:defRPr sz="5612"/>
+              <a:defRPr sz="4209"/>
             </a:lvl3pPr>
             <a:lvl4pPr>
-              <a:defRPr sz="4677"/>
+              <a:defRPr sz="3508"/>
             </a:lvl4pPr>
             <a:lvl5pPr>
-              <a:defRPr sz="4677"/>
+              <a:defRPr sz="3508"/>
             </a:lvl5pPr>
             <a:lvl6pPr>
-              <a:defRPr sz="4677"/>
+              <a:defRPr sz="3508"/>
             </a:lvl6pPr>
             <a:lvl7pPr>
-              <a:defRPr sz="4677"/>
+              <a:defRPr sz="3508"/>
             </a:lvl7pPr>
             <a:lvl8pPr>
-              <a:defRPr sz="4677"/>
+              <a:defRPr sz="3508"/>
             </a:lvl8pPr>
             <a:lvl9pPr>
-              <a:defRPr sz="4677"/>
+              <a:defRPr sz="3508"/>
             </a:lvl9pPr>
           </a:lstStyle>
           <a:p>
@@ -2442,7 +2454,7 @@
               <a:rPr lang="en-US" smtClean="0"/>
               <a:t>Fifth level</a:t>
             </a:r>
-            <a:endParaRPr lang="en-US" dirty="0"/>
+            <a:endParaRPr lang="en-US"/>
           </a:p>
         </p:txBody>
       </p:sp>
@@ -2458,8 +2470,8 @@
         </p:nvSpPr>
         <p:spPr>
           <a:xfrm>
-            <a:off x="1472909" y="9082564"/>
-            <a:ext cx="6896776" cy="16826573"/>
+            <a:off x="1472910" y="9082564"/>
+            <a:ext cx="6896775" cy="16826573"/>
           </a:xfrm>
         </p:spPr>
         <p:txBody>
@@ -2467,39 +2479,39 @@
           <a:lstStyle>
             <a:lvl1pPr marL="0" indent="0">
               <a:buNone/>
-              <a:defRPr sz="3742"/>
+              <a:defRPr sz="2806"/>
             </a:lvl1pPr>
-            <a:lvl2pPr marL="1069162" indent="0">
-              <a:buNone/>
-              <a:defRPr sz="3274"/>
+            <a:lvl2pPr marL="801883" indent="0">
+              <a:buNone/>
+              <a:defRPr sz="2455"/>
             </a:lvl2pPr>
-            <a:lvl3pPr marL="2138324" indent="0">
-              <a:buNone/>
-              <a:defRPr sz="2806"/>
+            <a:lvl3pPr marL="1603766" indent="0">
+              <a:buNone/>
+              <a:defRPr sz="2105"/>
             </a:lvl3pPr>
-            <a:lvl4pPr marL="3207487" indent="0">
-              <a:buNone/>
-              <a:defRPr sz="2339"/>
+            <a:lvl4pPr marL="2405649" indent="0">
+              <a:buNone/>
+              <a:defRPr sz="1754"/>
             </a:lvl4pPr>
-            <a:lvl5pPr marL="4276649" indent="0">
-              <a:buNone/>
-              <a:defRPr sz="2339"/>
+            <a:lvl5pPr marL="3207532" indent="0">
+              <a:buNone/>
+              <a:defRPr sz="1754"/>
             </a:lvl5pPr>
-            <a:lvl6pPr marL="5345811" indent="0">
-              <a:buNone/>
-              <a:defRPr sz="2339"/>
+            <a:lvl6pPr marL="4009415" indent="0">
+              <a:buNone/>
+              <a:defRPr sz="1754"/>
             </a:lvl6pPr>
-            <a:lvl7pPr marL="6414973" indent="0">
-              <a:buNone/>
-              <a:defRPr sz="2339"/>
+            <a:lvl7pPr marL="4811298" indent="0">
+              <a:buNone/>
+              <a:defRPr sz="1754"/>
             </a:lvl7pPr>
-            <a:lvl8pPr marL="7484135" indent="0">
-              <a:buNone/>
-              <a:defRPr sz="2339"/>
+            <a:lvl8pPr marL="5613182" indent="0">
+              <a:buNone/>
+              <a:defRPr sz="1754"/>
             </a:lvl8pPr>
-            <a:lvl9pPr marL="8553298" indent="0">
-              <a:buNone/>
-              <a:defRPr sz="2339"/>
+            <a:lvl9pPr marL="6415065" indent="0">
+              <a:buNone/>
+              <a:defRPr sz="1754"/>
             </a:lvl9pPr>
           </a:lstStyle>
           <a:p>
@@ -2530,7 +2542,7 @@
               <a:rPr lang="en-US" smtClean="0"/>
               <a:t>10/20/16</a:t>
             </a:fld>
-            <a:endParaRPr lang="en-US"/>
+            <a:endParaRPr lang="en-US" dirty="0"/>
           </a:p>
         </p:txBody>
       </p:sp>
@@ -2549,7 +2561,7 @@
           <a:bodyPr/>
           <a:lstStyle/>
           <a:p>
-            <a:endParaRPr lang="en-US"/>
+            <a:endParaRPr lang="en-US" dirty="0"/>
           </a:p>
         </p:txBody>
       </p:sp>
@@ -2572,20 +2584,25 @@
               <a:rPr lang="en-US" smtClean="0"/>
               <a:t>‹#›</a:t>
             </a:fld>
-            <a:endParaRPr lang="en-US"/>
+            <a:endParaRPr lang="en-US" dirty="0"/>
           </a:p>
         </p:txBody>
       </p:sp>
     </p:spTree>
     <p:extLst>
       <p:ext uri="{BB962C8B-B14F-4D97-AF65-F5344CB8AC3E}">
-        <p14:creationId xmlns:p14="http://schemas.microsoft.com/office/powerpoint/2010/main" val="689456368"/>
+        <p14:creationId xmlns:p14="http://schemas.microsoft.com/office/powerpoint/2010/main" val="861868726"/>
       </p:ext>
     </p:extLst>
   </p:cSld>
   <p:clrMapOvr>
     <a:masterClrMapping/>
   </p:clrMapOvr>
+  <p:extLst>
+    <p:ext uri="{DCECCB84-F9BA-43D5-87BE-67443E8EF086}">
+      <p15:sldGuideLst xmlns:p15="http://schemas.microsoft.com/office/powerpoint/2012/main"/>
+    </p:ext>
+  </p:extLst>
 </p:sldLayout>
 </file>
 
@@ -2618,15 +2635,15 @@
         </p:nvSpPr>
         <p:spPr>
           <a:xfrm>
-            <a:off x="1472909" y="2018348"/>
-            <a:ext cx="6896776" cy="7064216"/>
+            <a:off x="1472910" y="2018348"/>
+            <a:ext cx="6896775" cy="7064216"/>
           </a:xfrm>
         </p:spPr>
         <p:txBody>
           <a:bodyPr anchor="b"/>
           <a:lstStyle>
             <a:lvl1pPr>
-              <a:defRPr sz="7483"/>
+              <a:defRPr sz="5612"/>
             </a:lvl1pPr>
           </a:lstStyle>
           <a:p>
@@ -2634,7 +2651,7 @@
               <a:rPr lang="en-US" smtClean="0"/>
               <a:t>Click to edit Master title style</a:t>
             </a:r>
-            <a:endParaRPr lang="en-US" dirty="0"/>
+            <a:endParaRPr lang="en-US"/>
           </a:p>
         </p:txBody>
       </p:sp>
@@ -2642,7 +2659,7 @@
         <p:nvSpPr>
           <p:cNvPr id="3" name="Picture Placeholder 2"/>
           <p:cNvSpPr>
-            <a:spLocks noGrp="1" noChangeAspect="1"/>
+            <a:spLocks noGrp="1"/>
           </p:cNvSpPr>
           <p:nvPr>
             <p:ph type="pic" idx="1"/>
@@ -2650,55 +2667,51 @@
         </p:nvSpPr>
         <p:spPr>
           <a:xfrm>
-            <a:off x="9090826" y="4359077"/>
+            <a:off x="9090826" y="4359072"/>
             <a:ext cx="10825460" cy="21515024"/>
           </a:xfrm>
         </p:spPr>
         <p:txBody>
-          <a:bodyPr anchor="t"/>
+          <a:bodyPr/>
           <a:lstStyle>
             <a:lvl1pPr marL="0" indent="0">
               <a:buNone/>
-              <a:defRPr sz="7483"/>
+              <a:defRPr sz="5612"/>
             </a:lvl1pPr>
-            <a:lvl2pPr marL="1069162" indent="0">
-              <a:buNone/>
-              <a:defRPr sz="6548"/>
+            <a:lvl2pPr marL="801883" indent="0">
+              <a:buNone/>
+              <a:defRPr sz="4911"/>
             </a:lvl2pPr>
-            <a:lvl3pPr marL="2138324" indent="0">
-              <a:buNone/>
-              <a:defRPr sz="5612"/>
+            <a:lvl3pPr marL="1603766" indent="0">
+              <a:buNone/>
+              <a:defRPr sz="4209"/>
             </a:lvl3pPr>
-            <a:lvl4pPr marL="3207487" indent="0">
-              <a:buNone/>
-              <a:defRPr sz="4677"/>
+            <a:lvl4pPr marL="2405649" indent="0">
+              <a:buNone/>
+              <a:defRPr sz="3508"/>
             </a:lvl4pPr>
-            <a:lvl5pPr marL="4276649" indent="0">
-              <a:buNone/>
-              <a:defRPr sz="4677"/>
+            <a:lvl5pPr marL="3207532" indent="0">
+              <a:buNone/>
+              <a:defRPr sz="3508"/>
             </a:lvl5pPr>
-            <a:lvl6pPr marL="5345811" indent="0">
-              <a:buNone/>
-              <a:defRPr sz="4677"/>
+            <a:lvl6pPr marL="4009415" indent="0">
+              <a:buNone/>
+              <a:defRPr sz="3508"/>
             </a:lvl6pPr>
-            <a:lvl7pPr marL="6414973" indent="0">
-              <a:buNone/>
-              <a:defRPr sz="4677"/>
+            <a:lvl7pPr marL="4811298" indent="0">
+              <a:buNone/>
+              <a:defRPr sz="3508"/>
             </a:lvl7pPr>
-            <a:lvl8pPr marL="7484135" indent="0">
-              <a:buNone/>
-              <a:defRPr sz="4677"/>
+            <a:lvl8pPr marL="5613182" indent="0">
+              <a:buNone/>
+              <a:defRPr sz="3508"/>
             </a:lvl8pPr>
-            <a:lvl9pPr marL="8553298" indent="0">
-              <a:buNone/>
-              <a:defRPr sz="4677"/>
+            <a:lvl9pPr marL="6415065" indent="0">
+              <a:buNone/>
+              <a:defRPr sz="3508"/>
             </a:lvl9pPr>
           </a:lstStyle>
           <a:p>
-            <a:r>
-              <a:rPr lang="en-US" smtClean="0"/>
-              <a:t>Drag picture to placeholder or click icon to add</a:t>
-            </a:r>
             <a:endParaRPr lang="en-US" dirty="0"/>
           </a:p>
         </p:txBody>
@@ -2715,8 +2728,8 @@
         </p:nvSpPr>
         <p:spPr>
           <a:xfrm>
-            <a:off x="1472909" y="9082564"/>
-            <a:ext cx="6896776" cy="16826573"/>
+            <a:off x="1472910" y="9082564"/>
+            <a:ext cx="6896775" cy="16826573"/>
           </a:xfrm>
         </p:spPr>
         <p:txBody>
@@ -2724,39 +2737,39 @@
           <a:lstStyle>
             <a:lvl1pPr marL="0" indent="0">
               <a:buNone/>
-              <a:defRPr sz="3742"/>
+              <a:defRPr sz="2806"/>
             </a:lvl1pPr>
-            <a:lvl2pPr marL="1069162" indent="0">
-              <a:buNone/>
-              <a:defRPr sz="3274"/>
+            <a:lvl2pPr marL="801883" indent="0">
+              <a:buNone/>
+              <a:defRPr sz="2455"/>
             </a:lvl2pPr>
-            <a:lvl3pPr marL="2138324" indent="0">
-              <a:buNone/>
-              <a:defRPr sz="2806"/>
+            <a:lvl3pPr marL="1603766" indent="0">
+              <a:buNone/>
+              <a:defRPr sz="2105"/>
             </a:lvl3pPr>
-            <a:lvl4pPr marL="3207487" indent="0">
-              <a:buNone/>
-              <a:defRPr sz="2339"/>
+            <a:lvl4pPr marL="2405649" indent="0">
+              <a:buNone/>
+              <a:defRPr sz="1754"/>
             </a:lvl4pPr>
-            <a:lvl5pPr marL="4276649" indent="0">
-              <a:buNone/>
-              <a:defRPr sz="2339"/>
+            <a:lvl5pPr marL="3207532" indent="0">
+              <a:buNone/>
+              <a:defRPr sz="1754"/>
             </a:lvl5pPr>
-            <a:lvl6pPr marL="5345811" indent="0">
-              <a:buNone/>
-              <a:defRPr sz="2339"/>
+            <a:lvl6pPr marL="4009415" indent="0">
+              <a:buNone/>
+              <a:defRPr sz="1754"/>
             </a:lvl6pPr>
-            <a:lvl7pPr marL="6414973" indent="0">
-              <a:buNone/>
-              <a:defRPr sz="2339"/>
+            <a:lvl7pPr marL="4811298" indent="0">
+              <a:buNone/>
+              <a:defRPr sz="1754"/>
             </a:lvl7pPr>
-            <a:lvl8pPr marL="7484135" indent="0">
-              <a:buNone/>
-              <a:defRPr sz="2339"/>
+            <a:lvl8pPr marL="5613182" indent="0">
+              <a:buNone/>
+              <a:defRPr sz="1754"/>
             </a:lvl8pPr>
-            <a:lvl9pPr marL="8553298" indent="0">
-              <a:buNone/>
-              <a:defRPr sz="2339"/>
+            <a:lvl9pPr marL="6415065" indent="0">
+              <a:buNone/>
+              <a:defRPr sz="1754"/>
             </a:lvl9pPr>
           </a:lstStyle>
           <a:p>
@@ -2787,7 +2800,7 @@
               <a:rPr lang="en-US" smtClean="0"/>
               <a:t>10/20/16</a:t>
             </a:fld>
-            <a:endParaRPr lang="en-US"/>
+            <a:endParaRPr lang="en-US" dirty="0"/>
           </a:p>
         </p:txBody>
       </p:sp>
@@ -2806,7 +2819,7 @@
           <a:bodyPr/>
           <a:lstStyle/>
           <a:p>
-            <a:endParaRPr lang="en-US"/>
+            <a:endParaRPr lang="en-US" dirty="0"/>
           </a:p>
         </p:txBody>
       </p:sp>
@@ -2829,14 +2842,14 @@
               <a:rPr lang="en-US" smtClean="0"/>
               <a:t>‹#›</a:t>
             </a:fld>
-            <a:endParaRPr lang="en-US"/>
+            <a:endParaRPr lang="en-US" dirty="0"/>
           </a:p>
         </p:txBody>
       </p:sp>
     </p:spTree>
     <p:extLst>
       <p:ext uri="{BB962C8B-B14F-4D97-AF65-F5344CB8AC3E}">
-        <p14:creationId xmlns:p14="http://schemas.microsoft.com/office/powerpoint/2010/main" val="2018901411"/>
+        <p14:creationId xmlns:p14="http://schemas.microsoft.com/office/powerpoint/2010/main" val="650478867"/>
       </p:ext>
     </p:extLst>
   </p:cSld>
@@ -2880,7 +2893,7 @@
         </p:nvSpPr>
         <p:spPr>
           <a:xfrm>
-            <a:off x="1470124" y="1611882"/>
+            <a:off x="1470124" y="1611877"/>
             <a:ext cx="18443377" cy="5851808"/>
           </a:xfrm>
           <a:prstGeom prst="rect">
@@ -2897,7 +2910,7 @@
               <a:rPr lang="en-US" smtClean="0"/>
               <a:t>Click to edit Master title style</a:t>
             </a:r>
-            <a:endParaRPr lang="en-US" dirty="0"/>
+            <a:endParaRPr lang="en-US"/>
           </a:p>
         </p:txBody>
       </p:sp>
@@ -2959,7 +2972,7 @@
               <a:rPr lang="en-US" smtClean="0"/>
               <a:t>Fifth level</a:t>
             </a:r>
-            <a:endParaRPr lang="en-US" dirty="0"/>
+            <a:endParaRPr lang="en-US"/>
           </a:p>
         </p:txBody>
       </p:sp>
@@ -2975,7 +2988,7 @@
         </p:nvSpPr>
         <p:spPr>
           <a:xfrm>
-            <a:off x="1470124" y="28060644"/>
+            <a:off x="1470124" y="28060639"/>
             <a:ext cx="4811316" cy="1611875"/>
           </a:xfrm>
           <a:prstGeom prst="rect">
@@ -2986,7 +2999,7 @@
           <a:bodyPr vert="horz" lIns="91440" tIns="45720" rIns="91440" bIns="45720" rtlCol="0" anchor="ctr"/>
           <a:lstStyle>
             <a:lvl1pPr algn="l">
-              <a:defRPr sz="2806">
+              <a:defRPr sz="2105">
                 <a:solidFill>
                   <a:schemeClr val="tx1">
                     <a:tint val="75000"/>
@@ -3000,7 +3013,7 @@
               <a:rPr lang="en-US" smtClean="0"/>
               <a:t>10/20/16</a:t>
             </a:fld>
-            <a:endParaRPr lang="en-US"/>
+            <a:endParaRPr lang="en-US" dirty="0"/>
           </a:p>
         </p:txBody>
       </p:sp>
@@ -3016,7 +3029,7 @@
         </p:nvSpPr>
         <p:spPr>
           <a:xfrm>
-            <a:off x="7083326" y="28060644"/>
+            <a:off x="7083326" y="28060639"/>
             <a:ext cx="7216973" cy="1611875"/>
           </a:xfrm>
           <a:prstGeom prst="rect">
@@ -3027,7 +3040,7 @@
           <a:bodyPr vert="horz" lIns="91440" tIns="45720" rIns="91440" bIns="45720" rtlCol="0" anchor="ctr"/>
           <a:lstStyle>
             <a:lvl1pPr algn="ctr">
-              <a:defRPr sz="2806">
+              <a:defRPr sz="2105">
                 <a:solidFill>
                   <a:schemeClr val="tx1">
                     <a:tint val="75000"/>
@@ -3037,7 +3050,7 @@
             </a:lvl1pPr>
           </a:lstStyle>
           <a:p>
-            <a:endParaRPr lang="en-US"/>
+            <a:endParaRPr lang="en-US" dirty="0"/>
           </a:p>
         </p:txBody>
       </p:sp>
@@ -3053,7 +3066,7 @@
         </p:nvSpPr>
         <p:spPr>
           <a:xfrm>
-            <a:off x="15102185" y="28060644"/>
+            <a:off x="15102185" y="28060639"/>
             <a:ext cx="4811316" cy="1611875"/>
           </a:xfrm>
           <a:prstGeom prst="rect">
@@ -3064,7 +3077,7 @@
           <a:bodyPr vert="horz" lIns="91440" tIns="45720" rIns="91440" bIns="45720" rtlCol="0" anchor="ctr"/>
           <a:lstStyle>
             <a:lvl1pPr algn="r">
-              <a:defRPr sz="2806">
+              <a:defRPr sz="2105">
                 <a:solidFill>
                   <a:schemeClr val="tx1">
                     <a:tint val="75000"/>
@@ -3078,34 +3091,34 @@
               <a:rPr lang="en-US" smtClean="0"/>
               <a:t>‹#›</a:t>
             </a:fld>
-            <a:endParaRPr lang="en-US"/>
+            <a:endParaRPr lang="en-US" dirty="0"/>
           </a:p>
         </p:txBody>
       </p:sp>
     </p:spTree>
     <p:extLst>
       <p:ext uri="{BB962C8B-B14F-4D97-AF65-F5344CB8AC3E}">
-        <p14:creationId xmlns:p14="http://schemas.microsoft.com/office/powerpoint/2010/main" val="1150102633"/>
+        <p14:creationId xmlns:p14="http://schemas.microsoft.com/office/powerpoint/2010/main" val="1844746936"/>
       </p:ext>
     </p:extLst>
   </p:cSld>
   <p:clrMap bg1="lt1" tx1="dk1" bg2="lt2" tx2="dk2" accent1="accent1" accent2="accent2" accent3="accent3" accent4="accent4" accent5="accent5" accent6="accent6" hlink="hlink" folHlink="folHlink"/>
   <p:sldLayoutIdLst>
-    <p:sldLayoutId id="2147483715" r:id="rId1"/>
-    <p:sldLayoutId id="2147483716" r:id="rId2"/>
-    <p:sldLayoutId id="2147483717" r:id="rId3"/>
-    <p:sldLayoutId id="2147483718" r:id="rId4"/>
-    <p:sldLayoutId id="2147483719" r:id="rId5"/>
-    <p:sldLayoutId id="2147483720" r:id="rId6"/>
-    <p:sldLayoutId id="2147483721" r:id="rId7"/>
-    <p:sldLayoutId id="2147483722" r:id="rId8"/>
-    <p:sldLayoutId id="2147483723" r:id="rId9"/>
-    <p:sldLayoutId id="2147483724" r:id="rId10"/>
-    <p:sldLayoutId id="2147483725" r:id="rId11"/>
+    <p:sldLayoutId id="2147483859" r:id="rId1"/>
+    <p:sldLayoutId id="2147483860" r:id="rId2"/>
+    <p:sldLayoutId id="2147483861" r:id="rId3"/>
+    <p:sldLayoutId id="2147483862" r:id="rId4"/>
+    <p:sldLayoutId id="2147483863" r:id="rId5"/>
+    <p:sldLayoutId id="2147483864" r:id="rId6"/>
+    <p:sldLayoutId id="2147483865" r:id="rId7"/>
+    <p:sldLayoutId id="2147483866" r:id="rId8"/>
+    <p:sldLayoutId id="2147483867" r:id="rId9"/>
+    <p:sldLayoutId id="2147483868" r:id="rId10"/>
+    <p:sldLayoutId id="2147483869" r:id="rId11"/>
   </p:sldLayoutIdLst>
   <p:txStyles>
     <p:titleStyle>
-      <a:lvl1pPr algn="l" defTabSz="2138324" rtl="0" eaLnBrk="1" latinLnBrk="0" hangingPunct="1">
+      <a:lvl1pPr algn="l" defTabSz="1603766" rtl="0" eaLnBrk="1" latinLnBrk="0" hangingPunct="1">
         <a:lnSpc>
           <a:spcPct val="90000"/>
         </a:lnSpc>
@@ -3113,7 +3126,7 @@
           <a:spcPct val="0"/>
         </a:spcBef>
         <a:buNone/>
-        <a:defRPr sz="10289" kern="1200">
+        <a:defRPr sz="7717" kern="1200">
           <a:solidFill>
             <a:schemeClr val="tx1"/>
           </a:solidFill>
@@ -3124,16 +3137,16 @@
       </a:lvl1pPr>
     </p:titleStyle>
     <p:bodyStyle>
-      <a:lvl1pPr marL="534581" indent="-534581" algn="l" defTabSz="2138324" rtl="0" eaLnBrk="1" latinLnBrk="0" hangingPunct="1">
+      <a:lvl1pPr marL="400942" indent="-400942" algn="l" defTabSz="1603766" rtl="0" eaLnBrk="1" latinLnBrk="0" hangingPunct="1">
         <a:lnSpc>
           <a:spcPct val="90000"/>
         </a:lnSpc>
         <a:spcBef>
-          <a:spcPts val="2339"/>
+          <a:spcPts val="1754"/>
         </a:spcBef>
-        <a:buFont typeface="Arial" panose="020B0604020202020204" pitchFamily="34" charset="0"/>
+        <a:buFont typeface="Arial"/>
         <a:buChar char="•"/>
-        <a:defRPr sz="6548" kern="1200">
+        <a:defRPr sz="4911" kern="1200">
           <a:solidFill>
             <a:schemeClr val="tx1"/>
           </a:solidFill>
@@ -3142,50 +3155,14 @@
           <a:cs typeface="+mn-cs"/>
         </a:defRPr>
       </a:lvl1pPr>
-      <a:lvl2pPr marL="1603743" indent="-534581" algn="l" defTabSz="2138324" rtl="0" eaLnBrk="1" latinLnBrk="0" hangingPunct="1">
+      <a:lvl2pPr marL="1202825" indent="-400942" algn="l" defTabSz="1603766" rtl="0" eaLnBrk="1" latinLnBrk="0" hangingPunct="1">
         <a:lnSpc>
           <a:spcPct val="90000"/>
         </a:lnSpc>
         <a:spcBef>
-          <a:spcPts val="1169"/>
+          <a:spcPts val="877"/>
         </a:spcBef>
-        <a:buFont typeface="Arial" panose="020B0604020202020204" pitchFamily="34" charset="0"/>
-        <a:buChar char="•"/>
-        <a:defRPr sz="5612" kern="1200">
-          <a:solidFill>
-            <a:schemeClr val="tx1"/>
-          </a:solidFill>
-          <a:latin typeface="+mn-lt"/>
-          <a:ea typeface="+mn-ea"/>
-          <a:cs typeface="+mn-cs"/>
-        </a:defRPr>
-      </a:lvl2pPr>
-      <a:lvl3pPr marL="2672906" indent="-534581" algn="l" defTabSz="2138324" rtl="0" eaLnBrk="1" latinLnBrk="0" hangingPunct="1">
-        <a:lnSpc>
-          <a:spcPct val="90000"/>
-        </a:lnSpc>
-        <a:spcBef>
-          <a:spcPts val="1169"/>
-        </a:spcBef>
-        <a:buFont typeface="Arial" panose="020B0604020202020204" pitchFamily="34" charset="0"/>
-        <a:buChar char="•"/>
-        <a:defRPr sz="4677" kern="1200">
-          <a:solidFill>
-            <a:schemeClr val="tx1"/>
-          </a:solidFill>
-          <a:latin typeface="+mn-lt"/>
-          <a:ea typeface="+mn-ea"/>
-          <a:cs typeface="+mn-cs"/>
-        </a:defRPr>
-      </a:lvl3pPr>
-      <a:lvl4pPr marL="3742068" indent="-534581" algn="l" defTabSz="2138324" rtl="0" eaLnBrk="1" latinLnBrk="0" hangingPunct="1">
-        <a:lnSpc>
-          <a:spcPct val="90000"/>
-        </a:lnSpc>
-        <a:spcBef>
-          <a:spcPts val="1169"/>
-        </a:spcBef>
-        <a:buFont typeface="Arial" panose="020B0604020202020204" pitchFamily="34" charset="0"/>
+        <a:buFont typeface="Arial"/>
         <a:buChar char="•"/>
         <a:defRPr sz="4209" kern="1200">
           <a:solidFill>
@@ -3195,17 +3172,53 @@
           <a:ea typeface="+mn-ea"/>
           <a:cs typeface="+mn-cs"/>
         </a:defRPr>
-      </a:lvl4pPr>
-      <a:lvl5pPr marL="4811230" indent="-534581" algn="l" defTabSz="2138324" rtl="0" eaLnBrk="1" latinLnBrk="0" hangingPunct="1">
+      </a:lvl2pPr>
+      <a:lvl3pPr marL="2004708" indent="-400942" algn="l" defTabSz="1603766" rtl="0" eaLnBrk="1" latinLnBrk="0" hangingPunct="1">
         <a:lnSpc>
           <a:spcPct val="90000"/>
         </a:lnSpc>
         <a:spcBef>
-          <a:spcPts val="1169"/>
+          <a:spcPts val="877"/>
         </a:spcBef>
-        <a:buFont typeface="Arial" panose="020B0604020202020204" pitchFamily="34" charset="0"/>
+        <a:buFont typeface="Arial"/>
         <a:buChar char="•"/>
-        <a:defRPr sz="4209" kern="1200">
+        <a:defRPr sz="3508" kern="1200">
+          <a:solidFill>
+            <a:schemeClr val="tx1"/>
+          </a:solidFill>
+          <a:latin typeface="+mn-lt"/>
+          <a:ea typeface="+mn-ea"/>
+          <a:cs typeface="+mn-cs"/>
+        </a:defRPr>
+      </a:lvl3pPr>
+      <a:lvl4pPr marL="2806591" indent="-400942" algn="l" defTabSz="1603766" rtl="0" eaLnBrk="1" latinLnBrk="0" hangingPunct="1">
+        <a:lnSpc>
+          <a:spcPct val="90000"/>
+        </a:lnSpc>
+        <a:spcBef>
+          <a:spcPts val="877"/>
+        </a:spcBef>
+        <a:buFont typeface="Arial"/>
+        <a:buChar char="•"/>
+        <a:defRPr sz="3157" kern="1200">
+          <a:solidFill>
+            <a:schemeClr val="tx1"/>
+          </a:solidFill>
+          <a:latin typeface="+mn-lt"/>
+          <a:ea typeface="+mn-ea"/>
+          <a:cs typeface="+mn-cs"/>
+        </a:defRPr>
+      </a:lvl4pPr>
+      <a:lvl5pPr marL="3608474" indent="-400942" algn="l" defTabSz="1603766" rtl="0" eaLnBrk="1" latinLnBrk="0" hangingPunct="1">
+        <a:lnSpc>
+          <a:spcPct val="90000"/>
+        </a:lnSpc>
+        <a:spcBef>
+          <a:spcPts val="877"/>
+        </a:spcBef>
+        <a:buFont typeface="Arial"/>
+        <a:buChar char="•"/>
+        <a:defRPr sz="3157" kern="1200">
           <a:solidFill>
             <a:schemeClr val="tx1"/>
           </a:solidFill>
@@ -3214,16 +3227,16 @@
           <a:cs typeface="+mn-cs"/>
         </a:defRPr>
       </a:lvl5pPr>
-      <a:lvl6pPr marL="5880392" indent="-534581" algn="l" defTabSz="2138324" rtl="0" eaLnBrk="1" latinLnBrk="0" hangingPunct="1">
+      <a:lvl6pPr marL="4410357" indent="-400942" algn="l" defTabSz="1603766" rtl="0" eaLnBrk="1" latinLnBrk="0" hangingPunct="1">
         <a:lnSpc>
           <a:spcPct val="90000"/>
         </a:lnSpc>
         <a:spcBef>
-          <a:spcPts val="1169"/>
+          <a:spcPts val="877"/>
         </a:spcBef>
-        <a:buFont typeface="Arial" panose="020B0604020202020204" pitchFamily="34" charset="0"/>
+        <a:buFont typeface="Arial"/>
         <a:buChar char="•"/>
-        <a:defRPr sz="4209" kern="1200">
+        <a:defRPr sz="3157" kern="1200">
           <a:solidFill>
             <a:schemeClr val="tx1"/>
           </a:solidFill>
@@ -3232,16 +3245,16 @@
           <a:cs typeface="+mn-cs"/>
         </a:defRPr>
       </a:lvl6pPr>
-      <a:lvl7pPr marL="6949554" indent="-534581" algn="l" defTabSz="2138324" rtl="0" eaLnBrk="1" latinLnBrk="0" hangingPunct="1">
+      <a:lvl7pPr marL="5212240" indent="-400942" algn="l" defTabSz="1603766" rtl="0" eaLnBrk="1" latinLnBrk="0" hangingPunct="1">
         <a:lnSpc>
           <a:spcPct val="90000"/>
         </a:lnSpc>
         <a:spcBef>
-          <a:spcPts val="1169"/>
+          <a:spcPts val="877"/>
         </a:spcBef>
-        <a:buFont typeface="Arial" panose="020B0604020202020204" pitchFamily="34" charset="0"/>
+        <a:buFont typeface="Arial"/>
         <a:buChar char="•"/>
-        <a:defRPr sz="4209" kern="1200">
+        <a:defRPr sz="3157" kern="1200">
           <a:solidFill>
             <a:schemeClr val="tx1"/>
           </a:solidFill>
@@ -3250,16 +3263,16 @@
           <a:cs typeface="+mn-cs"/>
         </a:defRPr>
       </a:lvl7pPr>
-      <a:lvl8pPr marL="8018717" indent="-534581" algn="l" defTabSz="2138324" rtl="0" eaLnBrk="1" latinLnBrk="0" hangingPunct="1">
+      <a:lvl8pPr marL="6014123" indent="-400942" algn="l" defTabSz="1603766" rtl="0" eaLnBrk="1" latinLnBrk="0" hangingPunct="1">
         <a:lnSpc>
           <a:spcPct val="90000"/>
         </a:lnSpc>
         <a:spcBef>
-          <a:spcPts val="1169"/>
+          <a:spcPts val="877"/>
         </a:spcBef>
-        <a:buFont typeface="Arial" panose="020B0604020202020204" pitchFamily="34" charset="0"/>
+        <a:buFont typeface="Arial"/>
         <a:buChar char="•"/>
-        <a:defRPr sz="4209" kern="1200">
+        <a:defRPr sz="3157" kern="1200">
           <a:solidFill>
             <a:schemeClr val="tx1"/>
           </a:solidFill>
@@ -3268,16 +3281,16 @@
           <a:cs typeface="+mn-cs"/>
         </a:defRPr>
       </a:lvl8pPr>
-      <a:lvl9pPr marL="9087879" indent="-534581" algn="l" defTabSz="2138324" rtl="0" eaLnBrk="1" latinLnBrk="0" hangingPunct="1">
+      <a:lvl9pPr marL="6816006" indent="-400942" algn="l" defTabSz="1603766" rtl="0" eaLnBrk="1" latinLnBrk="0" hangingPunct="1">
         <a:lnSpc>
           <a:spcPct val="90000"/>
         </a:lnSpc>
         <a:spcBef>
-          <a:spcPts val="1169"/>
+          <a:spcPts val="877"/>
         </a:spcBef>
-        <a:buFont typeface="Arial" panose="020B0604020202020204" pitchFamily="34" charset="0"/>
+        <a:buFont typeface="Arial"/>
         <a:buChar char="•"/>
-        <a:defRPr sz="4209" kern="1200">
+        <a:defRPr sz="3157" kern="1200">
           <a:solidFill>
             <a:schemeClr val="tx1"/>
           </a:solidFill>
@@ -3291,8 +3304,8 @@
       <a:defPPr>
         <a:defRPr lang="en-US"/>
       </a:defPPr>
-      <a:lvl1pPr marL="0" algn="l" defTabSz="2138324" rtl="0" eaLnBrk="1" latinLnBrk="0" hangingPunct="1">
-        <a:defRPr sz="4209" kern="1200">
+      <a:lvl1pPr marL="0" algn="l" defTabSz="1603766" rtl="0" eaLnBrk="1" latinLnBrk="0" hangingPunct="1">
+        <a:defRPr sz="3157" kern="1200">
           <a:solidFill>
             <a:schemeClr val="tx1"/>
           </a:solidFill>
@@ -3301,8 +3314,8 @@
           <a:cs typeface="+mn-cs"/>
         </a:defRPr>
       </a:lvl1pPr>
-      <a:lvl2pPr marL="1069162" algn="l" defTabSz="2138324" rtl="0" eaLnBrk="1" latinLnBrk="0" hangingPunct="1">
-        <a:defRPr sz="4209" kern="1200">
+      <a:lvl2pPr marL="801883" algn="l" defTabSz="1603766" rtl="0" eaLnBrk="1" latinLnBrk="0" hangingPunct="1">
+        <a:defRPr sz="3157" kern="1200">
           <a:solidFill>
             <a:schemeClr val="tx1"/>
           </a:solidFill>
@@ -3311,8 +3324,8 @@
           <a:cs typeface="+mn-cs"/>
         </a:defRPr>
       </a:lvl2pPr>
-      <a:lvl3pPr marL="2138324" algn="l" defTabSz="2138324" rtl="0" eaLnBrk="1" latinLnBrk="0" hangingPunct="1">
-        <a:defRPr sz="4209" kern="1200">
+      <a:lvl3pPr marL="1603766" algn="l" defTabSz="1603766" rtl="0" eaLnBrk="1" latinLnBrk="0" hangingPunct="1">
+        <a:defRPr sz="3157" kern="1200">
           <a:solidFill>
             <a:schemeClr val="tx1"/>
           </a:solidFill>
@@ -3321,8 +3334,8 @@
           <a:cs typeface="+mn-cs"/>
         </a:defRPr>
       </a:lvl3pPr>
-      <a:lvl4pPr marL="3207487" algn="l" defTabSz="2138324" rtl="0" eaLnBrk="1" latinLnBrk="0" hangingPunct="1">
-        <a:defRPr sz="4209" kern="1200">
+      <a:lvl4pPr marL="2405649" algn="l" defTabSz="1603766" rtl="0" eaLnBrk="1" latinLnBrk="0" hangingPunct="1">
+        <a:defRPr sz="3157" kern="1200">
           <a:solidFill>
             <a:schemeClr val="tx1"/>
           </a:solidFill>
@@ -3331,8 +3344,8 @@
           <a:cs typeface="+mn-cs"/>
         </a:defRPr>
       </a:lvl4pPr>
-      <a:lvl5pPr marL="4276649" algn="l" defTabSz="2138324" rtl="0" eaLnBrk="1" latinLnBrk="0" hangingPunct="1">
-        <a:defRPr sz="4209" kern="1200">
+      <a:lvl5pPr marL="3207532" algn="l" defTabSz="1603766" rtl="0" eaLnBrk="1" latinLnBrk="0" hangingPunct="1">
+        <a:defRPr sz="3157" kern="1200">
           <a:solidFill>
             <a:schemeClr val="tx1"/>
           </a:solidFill>
@@ -3341,8 +3354,8 @@
           <a:cs typeface="+mn-cs"/>
         </a:defRPr>
       </a:lvl5pPr>
-      <a:lvl6pPr marL="5345811" algn="l" defTabSz="2138324" rtl="0" eaLnBrk="1" latinLnBrk="0" hangingPunct="1">
-        <a:defRPr sz="4209" kern="1200">
+      <a:lvl6pPr marL="4009415" algn="l" defTabSz="1603766" rtl="0" eaLnBrk="1" latinLnBrk="0" hangingPunct="1">
+        <a:defRPr sz="3157" kern="1200">
           <a:solidFill>
             <a:schemeClr val="tx1"/>
           </a:solidFill>
@@ -3351,8 +3364,8 @@
           <a:cs typeface="+mn-cs"/>
         </a:defRPr>
       </a:lvl6pPr>
-      <a:lvl7pPr marL="6414973" algn="l" defTabSz="2138324" rtl="0" eaLnBrk="1" latinLnBrk="0" hangingPunct="1">
-        <a:defRPr sz="4209" kern="1200">
+      <a:lvl7pPr marL="4811298" algn="l" defTabSz="1603766" rtl="0" eaLnBrk="1" latinLnBrk="0" hangingPunct="1">
+        <a:defRPr sz="3157" kern="1200">
           <a:solidFill>
             <a:schemeClr val="tx1"/>
           </a:solidFill>
@@ -3361,8 +3374,8 @@
           <a:cs typeface="+mn-cs"/>
         </a:defRPr>
       </a:lvl7pPr>
-      <a:lvl8pPr marL="7484135" algn="l" defTabSz="2138324" rtl="0" eaLnBrk="1" latinLnBrk="0" hangingPunct="1">
-        <a:defRPr sz="4209" kern="1200">
+      <a:lvl8pPr marL="5613182" algn="l" defTabSz="1603766" rtl="0" eaLnBrk="1" latinLnBrk="0" hangingPunct="1">
+        <a:defRPr sz="3157" kern="1200">
           <a:solidFill>
             <a:schemeClr val="tx1"/>
           </a:solidFill>
@@ -3371,8 +3384,8 @@
           <a:cs typeface="+mn-cs"/>
         </a:defRPr>
       </a:lvl8pPr>
-      <a:lvl9pPr marL="8553298" algn="l" defTabSz="2138324" rtl="0" eaLnBrk="1" latinLnBrk="0" hangingPunct="1">
-        <a:defRPr sz="4209" kern="1200">
+      <a:lvl9pPr marL="6415065" algn="l" defTabSz="1603766" rtl="0" eaLnBrk="1" latinLnBrk="0" hangingPunct="1">
+        <a:defRPr sz="3157" kern="1200">
           <a:solidFill>
             <a:schemeClr val="tx1"/>
           </a:solidFill>
@@ -3383,6 +3396,11 @@
       </a:lvl9pPr>
     </p:otherStyle>
   </p:txStyles>
+  <p:extLst>
+    <p:ext uri="{27BBF7A9-308A-43DC-89C8-2F10F3537804}">
+      <p15:sldGuideLst xmlns:p15="http://schemas.microsoft.com/office/powerpoint/2012/main"/>
+    </p:ext>
+  </p:extLst>
 </p:sldMaster>
 </file>
 
@@ -3392,9 +3410,7 @@
     <p:bg>
       <p:bgPr>
         <a:solidFill>
-          <a:schemeClr val="bg1">
-            <a:alpha val="91000"/>
-          </a:schemeClr>
+          <a:schemeClr val="bg1"/>
         </a:solidFill>
         <a:effectLst/>
       </p:bgPr>
@@ -3415,97 +3431,31 @@
       </p:grpSpPr>
       <p:sp>
         <p:nvSpPr>
-          <p:cNvPr id="2" name="Title 1"/>
-          <p:cNvSpPr>
-            <a:spLocks noGrp="1"/>
-          </p:cNvSpPr>
-          <p:nvPr>
-            <p:ph type="ctrTitle"/>
-          </p:nvPr>
-        </p:nvSpPr>
-        <p:spPr/>
-        <p:txBody>
-          <a:bodyPr/>
-          <a:lstStyle/>
-          <a:p>
-            <a:endParaRPr lang="en-US"/>
-          </a:p>
-        </p:txBody>
-      </p:sp>
-      <p:sp>
-        <p:nvSpPr>
-          <p:cNvPr id="3" name="Subtitle 2"/>
-          <p:cNvSpPr>
-            <a:spLocks noGrp="1"/>
-          </p:cNvSpPr>
-          <p:nvPr>
-            <p:ph type="subTitle" idx="1"/>
-          </p:nvPr>
-        </p:nvSpPr>
-        <p:spPr/>
-        <p:txBody>
-          <a:bodyPr/>
-          <a:lstStyle/>
-          <a:p>
-            <a:endParaRPr lang="en-US"/>
-          </a:p>
-        </p:txBody>
-      </p:sp>
-      <p:sp>
-        <p:nvSpPr>
-          <p:cNvPr id="4" name="TextBox 3"/>
+          <p:cNvPr id="5" name="TextBox 4"/>
           <p:cNvSpPr txBox="1"/>
           <p:nvPr/>
         </p:nvSpPr>
         <p:spPr>
           <a:xfrm>
-            <a:off x="-2" y="26289000"/>
-            <a:ext cx="21383625" cy="3986213"/>
+            <a:off x="26788" y="0"/>
+            <a:ext cx="21383625" cy="3863432"/>
           </a:xfrm>
           <a:prstGeom prst="rect">
             <a:avLst/>
           </a:prstGeom>
           <a:solidFill>
-            <a:schemeClr val="accent2"/>
+            <a:srgbClr val="FF8836"/>
           </a:solidFill>
           <a:ln>
-            <a:solidFill>
-              <a:schemeClr val="accent2"/>
-            </a:solidFill>
+            <a:noFill/>
           </a:ln>
-        </p:spPr>
-        <p:txBody>
-          <a:bodyPr wrap="square" rtlCol="0">
-            <a:spAutoFit/>
-          </a:bodyPr>
-          <a:lstStyle/>
-          <a:p>
-            <a:endParaRPr lang="en-US" dirty="0"/>
-          </a:p>
-        </p:txBody>
-      </p:sp>
-      <p:sp>
-        <p:nvSpPr>
-          <p:cNvPr id="5" name="TextBox 4"/>
-          <p:cNvSpPr txBox="1"/>
-          <p:nvPr/>
-        </p:nvSpPr>
-        <p:spPr>
-          <a:xfrm>
-            <a:off x="-1" y="0"/>
-            <a:ext cx="21383625" cy="3986213"/>
-          </a:xfrm>
-          <a:prstGeom prst="rect">
-            <a:avLst/>
-          </a:prstGeom>
-          <a:solidFill>
-            <a:schemeClr val="accent2"/>
-          </a:solidFill>
-          <a:ln>
-            <a:solidFill>
-              <a:schemeClr val="accent2"/>
-            </a:solidFill>
-          </a:ln>
+          <a:effectLst>
+            <a:outerShdw blurRad="50800" dist="76200" dir="5400000" algn="t" rotWithShape="0">
+              <a:prstClr val="black">
+                <a:alpha val="40000"/>
+              </a:prstClr>
+            </a:outerShdw>
+          </a:effectLst>
         </p:spPr>
         <p:txBody>
           <a:bodyPr wrap="square" rtlCol="0">
@@ -3539,7 +3489,7 @@
         </p:blipFill>
         <p:spPr>
           <a:xfrm>
-            <a:off x="406003" y="2047516"/>
+            <a:off x="520303" y="2047515"/>
             <a:ext cx="9879124" cy="1427956"/>
           </a:xfrm>
           <a:prstGeom prst="rect">
@@ -3571,17 +3521,29 @@
           <a:p>
             <a:pPr algn="r"/>
             <a:r>
-              <a:rPr lang="en-US" dirty="0" smtClean="0"/>
+              <a:rPr lang="en-US" dirty="0" smtClean="0">
+                <a:latin typeface="Helvetica Neue" charset="0"/>
+                <a:ea typeface="Helvetica Neue" charset="0"/>
+                <a:cs typeface="Helvetica Neue" charset="0"/>
+              </a:rPr>
               <a:t>Andrei-Mihai Nicolae</a:t>
             </a:r>
           </a:p>
           <a:p>
             <a:pPr algn="r"/>
             <a:r>
-              <a:rPr lang="en-US" dirty="0" smtClean="0"/>
+              <a:rPr lang="en-US" dirty="0" smtClean="0">
+                <a:latin typeface="Helvetica Neue" charset="0"/>
+                <a:ea typeface="Helvetica Neue" charset="0"/>
+                <a:cs typeface="Helvetica Neue" charset="0"/>
+              </a:rPr>
               <a:t>2147392</a:t>
             </a:r>
-            <a:endParaRPr lang="en-US" dirty="0"/>
+            <a:endParaRPr lang="en-US" dirty="0">
+              <a:latin typeface="Helvetica Neue" charset="0"/>
+              <a:ea typeface="Helvetica Neue" charset="0"/>
+              <a:cs typeface="Helvetica Neue" charset="0"/>
+            </a:endParaRPr>
           </a:p>
         </p:txBody>
       </p:sp>
@@ -3593,8 +3555,8 @@
         </p:nvSpPr>
         <p:spPr>
           <a:xfrm>
-            <a:off x="1475184" y="455244"/>
-            <a:ext cx="18304669" cy="1107996"/>
+            <a:off x="741162" y="481566"/>
+            <a:ext cx="19901297" cy="1046440"/>
           </a:xfrm>
           <a:prstGeom prst="rect">
             <a:avLst/>
@@ -3608,22 +3570,403 @@
           <a:lstStyle/>
           <a:p>
             <a:r>
-              <a:rPr lang="en-US" sz="6600" dirty="0" err="1" smtClean="0"/>
+              <a:rPr lang="en-US" sz="6200" b="1" dirty="0" smtClean="0">
+                <a:latin typeface="Helvetica Neue" charset="0"/>
+                <a:ea typeface="Helvetica Neue" charset="0"/>
+                <a:cs typeface="Helvetica Neue" charset="0"/>
+              </a:rPr>
               <a:t>Kingternship</a:t>
             </a:r>
             <a:r>
-              <a:rPr lang="en-US" sz="6600" dirty="0" smtClean="0"/>
-              <a:t> </a:t>
-            </a:r>
-            <a:r>
-              <a:rPr lang="mr-IN" sz="6600" dirty="0" smtClean="0"/>
+              <a:rPr lang="mr-IN" sz="6200" b="1" dirty="0" smtClean="0">
+                <a:latin typeface="Helvetica Neue" charset="0"/>
+                <a:ea typeface="Helvetica Neue" charset="0"/>
+                <a:cs typeface="Helvetica Neue" charset="0"/>
+              </a:rPr>
               <a:t>–</a:t>
             </a:r>
             <a:r>
-              <a:rPr lang="en-US" sz="6600" dirty="0" smtClean="0"/>
-              <a:t> Seriously Playful Software Engineering</a:t>
-            </a:r>
-            <a:endParaRPr lang="en-US" sz="6600" dirty="0"/>
+              <a:rPr lang="en-US" sz="6200" b="1" dirty="0" smtClean="0">
+                <a:latin typeface="Helvetica Neue" charset="0"/>
+                <a:ea typeface="Helvetica Neue" charset="0"/>
+                <a:cs typeface="Helvetica Neue" charset="0"/>
+              </a:rPr>
+              <a:t>Seriously Playful Software Engineering</a:t>
+            </a:r>
+            <a:endParaRPr lang="en-US" sz="6200" b="1" dirty="0">
+              <a:latin typeface="Helvetica Neue" charset="0"/>
+              <a:ea typeface="Helvetica Neue" charset="0"/>
+              <a:cs typeface="Helvetica Neue" charset="0"/>
+            </a:endParaRPr>
+          </a:p>
+        </p:txBody>
+      </p:sp>
+      <p:graphicFrame>
+        <p:nvGraphicFramePr>
+          <p:cNvPr id="26" name="Table 25"/>
+          <p:cNvGraphicFramePr>
+            <a:graphicFrameLocks noGrp="1"/>
+          </p:cNvGraphicFramePr>
+          <p:nvPr>
+            <p:extLst>
+              <p:ext uri="{D42A27DB-BD31-4B8C-83A1-F6EECF244321}">
+                <p14:modId xmlns:p14="http://schemas.microsoft.com/office/powerpoint/2010/main" val="41632834"/>
+              </p:ext>
+            </p:extLst>
+          </p:nvPr>
+        </p:nvGraphicFramePr>
+        <p:xfrm>
+          <a:off x="520302" y="4597782"/>
+          <a:ext cx="20396598" cy="22013603"/>
+        </p:xfrm>
+        <a:graphic>
+          <a:graphicData uri="http://schemas.openxmlformats.org/drawingml/2006/table">
+            <a:tbl>
+              <a:tblPr firstRow="1" bandRow="1">
+                <a:tableStyleId>{5C22544A-7EE6-4342-B048-85BDC9FD1C3A}</a:tableStyleId>
+              </a:tblPr>
+              <a:tblGrid>
+                <a:gridCol w="6798866"/>
+                <a:gridCol w="6798866"/>
+                <a:gridCol w="6798866"/>
+              </a:tblGrid>
+              <a:tr h="22013603">
+                <a:tc>
+                  <a:txBody>
+                    <a:bodyPr/>
+                    <a:lstStyle/>
+                    <a:p>
+                      <a:endParaRPr lang="en-US" dirty="0"/>
+                    </a:p>
+                  </a:txBody>
+                  <a:tcPr>
+                    <a:lnR w="28575" cap="flat" cmpd="sng" algn="ctr">
+                      <a:solidFill>
+                        <a:schemeClr val="bg2"/>
+                      </a:solidFill>
+                      <a:prstDash val="solid"/>
+                      <a:round/>
+                      <a:headEnd type="none" w="med" len="med"/>
+                      <a:tailEnd type="none" w="med" len="med"/>
+                    </a:lnR>
+                    <a:lnB w="28575" cap="flat" cmpd="sng" algn="ctr">
+                      <a:solidFill>
+                        <a:schemeClr val="bg2"/>
+                      </a:solidFill>
+                      <a:prstDash val="solid"/>
+                      <a:round/>
+                      <a:headEnd type="none" w="med" len="med"/>
+                      <a:tailEnd type="none" w="med" len="med"/>
+                    </a:lnB>
+                    <a:noFill/>
+                  </a:tcPr>
+                </a:tc>
+                <a:tc>
+                  <a:txBody>
+                    <a:bodyPr/>
+                    <a:lstStyle/>
+                    <a:p>
+                      <a:endParaRPr lang="en-US" dirty="0"/>
+                    </a:p>
+                  </a:txBody>
+                  <a:tcPr>
+                    <a:lnL w="28575" cap="flat" cmpd="sng" algn="ctr">
+                      <a:solidFill>
+                        <a:schemeClr val="bg2"/>
+                      </a:solidFill>
+                      <a:prstDash val="solid"/>
+                      <a:round/>
+                      <a:headEnd type="none" w="med" len="med"/>
+                      <a:tailEnd type="none" w="med" len="med"/>
+                    </a:lnL>
+                    <a:lnR w="28575" cap="flat" cmpd="sng" algn="ctr">
+                      <a:solidFill>
+                        <a:schemeClr val="bg2"/>
+                      </a:solidFill>
+                      <a:prstDash val="solid"/>
+                      <a:round/>
+                      <a:headEnd type="none" w="med" len="med"/>
+                      <a:tailEnd type="none" w="med" len="med"/>
+                    </a:lnR>
+                    <a:lnB w="28575" cap="flat" cmpd="sng" algn="ctr">
+                      <a:solidFill>
+                        <a:schemeClr val="bg2"/>
+                      </a:solidFill>
+                      <a:prstDash val="solid"/>
+                      <a:round/>
+                      <a:headEnd type="none" w="med" len="med"/>
+                      <a:tailEnd type="none" w="med" len="med"/>
+                    </a:lnB>
+                    <a:noFill/>
+                  </a:tcPr>
+                </a:tc>
+                <a:tc>
+                  <a:txBody>
+                    <a:bodyPr/>
+                    <a:lstStyle/>
+                    <a:p>
+                      <a:endParaRPr lang="en-US" dirty="0"/>
+                    </a:p>
+                  </a:txBody>
+                  <a:tcPr>
+                    <a:lnL w="28575" cap="flat" cmpd="sng" algn="ctr">
+                      <a:solidFill>
+                        <a:schemeClr val="bg2"/>
+                      </a:solidFill>
+                      <a:prstDash val="solid"/>
+                      <a:round/>
+                      <a:headEnd type="none" w="med" len="med"/>
+                      <a:tailEnd type="none" w="med" len="med"/>
+                    </a:lnL>
+                    <a:lnB w="28575" cap="flat" cmpd="sng" algn="ctr">
+                      <a:solidFill>
+                        <a:schemeClr val="bg2"/>
+                      </a:solidFill>
+                      <a:prstDash val="solid"/>
+                      <a:round/>
+                      <a:headEnd type="none" w="med" len="med"/>
+                      <a:tailEnd type="none" w="med" len="med"/>
+                    </a:lnB>
+                    <a:noFill/>
+                  </a:tcPr>
+                </a:tc>
+              </a:tr>
+            </a:tbl>
+          </a:graphicData>
+        </a:graphic>
+      </p:graphicFrame>
+      <p:sp>
+        <p:nvSpPr>
+          <p:cNvPr id="27" name="TextBox 26"/>
+          <p:cNvSpPr txBox="1"/>
+          <p:nvPr/>
+        </p:nvSpPr>
+        <p:spPr>
+          <a:xfrm>
+            <a:off x="520303" y="4686300"/>
+            <a:ext cx="6375797" cy="584775"/>
+          </a:xfrm>
+          <a:prstGeom prst="rect">
+            <a:avLst/>
+          </a:prstGeom>
+          <a:solidFill>
+            <a:srgbClr val="FF8836"/>
+          </a:solidFill>
+          <a:effectLst>
+            <a:outerShdw blurRad="50800" dist="76200" dir="5400000" algn="t" rotWithShape="0">
+              <a:prstClr val="black">
+                <a:alpha val="40000"/>
+              </a:prstClr>
+            </a:outerShdw>
+          </a:effectLst>
+        </p:spPr>
+        <p:txBody>
+          <a:bodyPr wrap="square" rtlCol="0">
+            <a:spAutoFit/>
+          </a:bodyPr>
+          <a:lstStyle/>
+          <a:p>
+            <a:pPr algn="ctr"/>
+            <a:r>
+              <a:rPr lang="en-US" sz="3200" b="1" dirty="0" smtClean="0">
+                <a:latin typeface="Helvetica Neue" charset="0"/>
+                <a:ea typeface="Helvetica Neue" charset="0"/>
+                <a:cs typeface="Helvetica Neue" charset="0"/>
+              </a:rPr>
+              <a:t>How was the Kingdom born?</a:t>
+            </a:r>
+            <a:endParaRPr lang="en-US" sz="3200" b="1" dirty="0">
+              <a:latin typeface="Helvetica Neue" charset="0"/>
+              <a:ea typeface="Helvetica Neue" charset="0"/>
+              <a:cs typeface="Helvetica Neue" charset="0"/>
+            </a:endParaRPr>
+          </a:p>
+        </p:txBody>
+      </p:sp>
+      <p:sp>
+        <p:nvSpPr>
+          <p:cNvPr id="28" name="TextBox 27"/>
+          <p:cNvSpPr txBox="1"/>
+          <p:nvPr/>
+        </p:nvSpPr>
+        <p:spPr>
+          <a:xfrm>
+            <a:off x="520303" y="5606278"/>
+            <a:ext cx="6375797" cy="1682512"/>
+          </a:xfrm>
+          <a:prstGeom prst="rect">
+            <a:avLst/>
+          </a:prstGeom>
+          <a:noFill/>
+        </p:spPr>
+        <p:txBody>
+          <a:bodyPr wrap="square" rtlCol="0">
+            <a:spAutoFit/>
+          </a:bodyPr>
+          <a:lstStyle/>
+          <a:p>
+            <a:pPr algn="just">
+              <a:lnSpc>
+                <a:spcPts val="3118"/>
+              </a:lnSpc>
+            </a:pPr>
+            <a:r>
+              <a:rPr lang="en-US" sz="2400" dirty="0" smtClean="0">
+                <a:latin typeface="Helvetica Neue" charset="0"/>
+                <a:ea typeface="Helvetica Neue" charset="0"/>
+                <a:cs typeface="Helvetica Neue" charset="0"/>
+              </a:rPr>
+              <a:t>King is a Swedish multinational company  founded in 2013 which has evolved throughout the years into one of the top mobile games development companies.</a:t>
+            </a:r>
+            <a:endParaRPr lang="en-US" sz="2400" dirty="0">
+              <a:latin typeface="Helvetica Neue" charset="0"/>
+              <a:ea typeface="Helvetica Neue" charset="0"/>
+              <a:cs typeface="Helvetica Neue" charset="0"/>
+            </a:endParaRPr>
+          </a:p>
+        </p:txBody>
+      </p:sp>
+      <p:pic>
+        <p:nvPicPr>
+          <p:cNvPr id="29" name="Picture 28"/>
+          <p:cNvPicPr>
+            <a:picLocks noChangeAspect="1"/>
+          </p:cNvPicPr>
+          <p:nvPr/>
+        </p:nvPicPr>
+        <p:blipFill>
+          <a:blip r:embed="rId4">
+            <a:extLst>
+              <a:ext uri="{28A0092B-C50C-407E-A947-70E740481C1C}">
+                <a14:useLocalDpi xmlns:a14="http://schemas.microsoft.com/office/drawing/2010/main" val="0"/>
+              </a:ext>
+            </a:extLst>
+          </a:blip>
+          <a:stretch>
+            <a:fillRect/>
+          </a:stretch>
+        </p:blipFill>
+        <p:spPr>
+          <a:xfrm>
+            <a:off x="1257100" y="7426785"/>
+            <a:ext cx="4902200" cy="3263900"/>
+          </a:xfrm>
+          <a:prstGeom prst="rect">
+            <a:avLst/>
+          </a:prstGeom>
+        </p:spPr>
+      </p:pic>
+      <p:sp>
+        <p:nvSpPr>
+          <p:cNvPr id="30" name="TextBox 29"/>
+          <p:cNvSpPr txBox="1"/>
+          <p:nvPr/>
+        </p:nvSpPr>
+        <p:spPr>
+          <a:xfrm>
+            <a:off x="520301" y="11057860"/>
+            <a:ext cx="6375799" cy="2477601"/>
+          </a:xfrm>
+          <a:prstGeom prst="rect">
+            <a:avLst/>
+          </a:prstGeom>
+          <a:noFill/>
+        </p:spPr>
+        <p:txBody>
+          <a:bodyPr wrap="square" rtlCol="0">
+            <a:spAutoFit/>
+          </a:bodyPr>
+          <a:lstStyle/>
+          <a:p>
+            <a:pPr algn="just">
+              <a:lnSpc>
+                <a:spcPts val="3118"/>
+              </a:lnSpc>
+            </a:pPr>
+            <a:r>
+              <a:rPr lang="en-US" sz="2400" dirty="0" smtClean="0">
+                <a:latin typeface="Helvetica Neue" charset="0"/>
+                <a:ea typeface="Helvetica Neue" charset="0"/>
+                <a:cs typeface="Helvetica Neue" charset="0"/>
+              </a:rPr>
+              <a:t>It has produced some of the top games on all mobile platforms including Candy Crush Saga which at its peak was played roughly by 100 million people around the globe. </a:t>
+            </a:r>
+          </a:p>
+          <a:p>
+            <a:pPr algn="just">
+              <a:lnSpc>
+                <a:spcPts val="3118"/>
+              </a:lnSpc>
+            </a:pPr>
+            <a:r>
+              <a:rPr lang="en-US" sz="2400" dirty="0" smtClean="0">
+                <a:latin typeface="Helvetica Neue" charset="0"/>
+                <a:ea typeface="Helvetica Neue" charset="0"/>
+                <a:cs typeface="Helvetica Neue" charset="0"/>
+              </a:rPr>
+              <a:t>In February 2016, King was bought and merged into Activision Blizzard.</a:t>
+            </a:r>
+            <a:endParaRPr lang="en-US" sz="2400" dirty="0">
+              <a:latin typeface="Helvetica Neue" charset="0"/>
+              <a:ea typeface="Helvetica Neue" charset="0"/>
+              <a:cs typeface="Helvetica Neue" charset="0"/>
+            </a:endParaRPr>
+          </a:p>
+        </p:txBody>
+      </p:sp>
+      <p:sp>
+        <p:nvSpPr>
+          <p:cNvPr id="31" name="TextBox 30"/>
+          <p:cNvSpPr txBox="1"/>
+          <p:nvPr/>
+        </p:nvSpPr>
+        <p:spPr>
+          <a:xfrm>
+            <a:off x="520301" y="13898443"/>
+            <a:ext cx="6375797" cy="584775"/>
+          </a:xfrm>
+          <a:prstGeom prst="rect">
+            <a:avLst/>
+          </a:prstGeom>
+          <a:solidFill>
+            <a:srgbClr val="FF8836"/>
+          </a:solidFill>
+          <a:effectLst>
+            <a:outerShdw blurRad="50800" dist="76200" dir="5400000" algn="t" rotWithShape="0">
+              <a:prstClr val="black">
+                <a:alpha val="40000"/>
+              </a:prstClr>
+            </a:outerShdw>
+          </a:effectLst>
+        </p:spPr>
+        <p:txBody>
+          <a:bodyPr wrap="square" rtlCol="0">
+            <a:spAutoFit/>
+          </a:bodyPr>
+          <a:lstStyle/>
+          <a:p>
+            <a:pPr algn="ctr"/>
+            <a:r>
+              <a:rPr lang="en-US" sz="3200" b="1" dirty="0" smtClean="0">
+                <a:latin typeface="Helvetica Neue" charset="0"/>
+                <a:ea typeface="Helvetica Neue" charset="0"/>
+                <a:cs typeface="Helvetica Neue" charset="0"/>
+              </a:rPr>
+              <a:t>My role as a </a:t>
+            </a:r>
+            <a:r>
+              <a:rPr lang="en-US" sz="3200" b="1" dirty="0" err="1" smtClean="0">
+                <a:latin typeface="Helvetica Neue" charset="0"/>
+                <a:ea typeface="Helvetica Neue" charset="0"/>
+                <a:cs typeface="Helvetica Neue" charset="0"/>
+              </a:rPr>
+              <a:t>Kingtern</a:t>
+            </a:r>
+            <a:endParaRPr lang="en-US" sz="3200" b="1" dirty="0">
+              <a:latin typeface="Helvetica Neue" charset="0"/>
+              <a:ea typeface="Helvetica Neue" charset="0"/>
+              <a:cs typeface="Helvetica Neue" charset="0"/>
+            </a:endParaRPr>
           </a:p>
         </p:txBody>
       </p:sp>
@@ -3637,13 +3980,20 @@
   <p:clrMapOvr>
     <a:masterClrMapping/>
   </p:clrMapOvr>
+  <p:timing>
+    <p:tnLst>
+      <p:par>
+        <p:cTn id="1" dur="indefinite" restart="never" nodeType="tmRoot"/>
+      </p:par>
+    </p:tnLst>
+  </p:timing>
 </p:sld>
 </file>
 
 <file path=ppt/theme/theme1.xml><?xml version="1.0" encoding="utf-8"?>
 <a:theme xmlns:a="http://schemas.openxmlformats.org/drawingml/2006/main" name="Office Theme">
   <a:themeElements>
-    <a:clrScheme name="Office Theme">
+    <a:clrScheme name="Office">
       <a:dk1>
         <a:sysClr val="windowText" lastClr="000000"/>
       </a:dk1>
@@ -3681,14 +4031,14 @@
         <a:srgbClr val="954F72"/>
       </a:folHlink>
     </a:clrScheme>
-    <a:fontScheme name="Office Theme">
+    <a:fontScheme name="Office">
       <a:majorFont>
         <a:latin typeface="Calibri Light" panose="020F0302020204030204"/>
         <a:ea typeface=""/>
         <a:cs typeface=""/>
-        <a:font script="Jpan" typeface="ＭＳ Ｐゴシック"/>
+        <a:font script="Jpan" typeface="Yu Gothic Light"/>
         <a:font script="Hang" typeface="맑은 고딕"/>
-        <a:font script="Hans" typeface="宋体"/>
+        <a:font script="Hans" typeface="DengXian Light"/>
         <a:font script="Hant" typeface="新細明體"/>
         <a:font script="Arab" typeface="Times New Roman"/>
         <a:font script="Hebr" typeface="Times New Roman"/>
@@ -3721,9 +4071,9 @@
         <a:latin typeface="Calibri" panose="020F0502020204030204"/>
         <a:ea typeface=""/>
         <a:cs typeface=""/>
-        <a:font script="Jpan" typeface="ＭＳ Ｐゴシック"/>
+        <a:font script="Jpan" typeface="Yu Gothic"/>
         <a:font script="Hang" typeface="맑은 고딕"/>
-        <a:font script="Hans" typeface="宋体"/>
+        <a:font script="Hans" typeface="DengXian"/>
         <a:font script="Hant" typeface="新細明體"/>
         <a:font script="Arab" typeface="Arial"/>
         <a:font script="Hebr" typeface="Arial"/>
@@ -3753,7 +4103,7 @@
         <a:font script="Geor" typeface="Sylfaen"/>
       </a:minorFont>
     </a:fontScheme>
-    <a:fmtScheme name="Office Theme">
+    <a:fmtScheme name="Office">
       <a:fillStyleLst>
         <a:solidFill>
           <a:schemeClr val="phClr"/>

</xml_diff>

<commit_message>
Two thirds of the poster is done... Need to address the final 2 issues
</commit_message>
<xml_diff>
--- a/SESP/SESP-Poster.pptx
+++ b/SESP/SESP-Poster.pptx
@@ -3505,7 +3505,7 @@
         </p:nvSpPr>
         <p:spPr>
           <a:xfrm>
-            <a:off x="14363700" y="1964224"/>
+            <a:off x="14363700" y="1964223"/>
             <a:ext cx="6553200" cy="1594539"/>
           </a:xfrm>
           <a:prstGeom prst="rect">
@@ -3521,8 +3521,8 @@
           <a:p>
             <a:pPr algn="r"/>
             <a:r>
-              <a:rPr lang="en-US" dirty="0" smtClean="0">
-                <a:latin typeface="Helvetica Neue" charset="0"/>
+              <a:rPr lang="en-US" b="1" dirty="0" smtClean="0">
+                <a:latin typeface="+mj-lt"/>
                 <a:ea typeface="Helvetica Neue" charset="0"/>
                 <a:cs typeface="Helvetica Neue" charset="0"/>
               </a:rPr>
@@ -3532,15 +3532,15 @@
           <a:p>
             <a:pPr algn="r"/>
             <a:r>
-              <a:rPr lang="en-US" dirty="0" smtClean="0">
-                <a:latin typeface="Helvetica Neue" charset="0"/>
+              <a:rPr lang="en-US" b="1" dirty="0" smtClean="0">
+                <a:latin typeface="+mj-lt"/>
                 <a:ea typeface="Helvetica Neue" charset="0"/>
                 <a:cs typeface="Helvetica Neue" charset="0"/>
               </a:rPr>
               <a:t>2147392</a:t>
             </a:r>
-            <a:endParaRPr lang="en-US" dirty="0">
-              <a:latin typeface="Helvetica Neue" charset="0"/>
+            <a:endParaRPr lang="en-US" b="1" dirty="0">
+              <a:latin typeface="+mj-lt"/>
               <a:ea typeface="Helvetica Neue" charset="0"/>
               <a:cs typeface="Helvetica Neue" charset="0"/>
             </a:endParaRPr>
@@ -3555,8 +3555,8 @@
         </p:nvSpPr>
         <p:spPr>
           <a:xfrm>
-            <a:off x="741162" y="481566"/>
-            <a:ext cx="19901297" cy="1046440"/>
+            <a:off x="1105209" y="480011"/>
+            <a:ext cx="19226782" cy="1200329"/>
           </a:xfrm>
           <a:prstGeom prst="rect">
             <a:avLst/>
@@ -3570,33 +3570,33 @@
           <a:lstStyle/>
           <a:p>
             <a:r>
-              <a:rPr lang="en-US" sz="6200" b="1" dirty="0" smtClean="0">
-                <a:latin typeface="Helvetica Neue" charset="0"/>
-                <a:ea typeface="Helvetica Neue" charset="0"/>
-                <a:cs typeface="Helvetica Neue" charset="0"/>
+              <a:rPr lang="en-US" sz="7200" b="1" dirty="0" smtClean="0">
+                <a:latin typeface="+mj-lt"/>
+                <a:ea typeface="Calibri" charset="0"/>
+                <a:cs typeface="Calibri" charset="0"/>
               </a:rPr>
               <a:t>Kingternship</a:t>
             </a:r>
             <a:r>
-              <a:rPr lang="mr-IN" sz="6200" b="1" dirty="0" smtClean="0">
-                <a:latin typeface="Helvetica Neue" charset="0"/>
-                <a:ea typeface="Helvetica Neue" charset="0"/>
-                <a:cs typeface="Helvetica Neue" charset="0"/>
+              <a:rPr lang="mr-IN" sz="7200" b="1" dirty="0" smtClean="0">
+                <a:latin typeface="+mj-lt"/>
+                <a:ea typeface="Calibri" charset="0"/>
+                <a:cs typeface="Calibri" charset="0"/>
               </a:rPr>
               <a:t>–</a:t>
             </a:r>
             <a:r>
-              <a:rPr lang="en-US" sz="6200" b="1" dirty="0" smtClean="0">
-                <a:latin typeface="Helvetica Neue" charset="0"/>
-                <a:ea typeface="Helvetica Neue" charset="0"/>
-                <a:cs typeface="Helvetica Neue" charset="0"/>
+              <a:rPr lang="en-US" sz="7200" b="1" dirty="0" smtClean="0">
+                <a:latin typeface="+mj-lt"/>
+                <a:ea typeface="Calibri" charset="0"/>
+                <a:cs typeface="Calibri" charset="0"/>
               </a:rPr>
               <a:t>Seriously Playful Software Engineering</a:t>
             </a:r>
-            <a:endParaRPr lang="en-US" sz="6200" b="1" dirty="0">
-              <a:latin typeface="Helvetica Neue" charset="0"/>
-              <a:ea typeface="Helvetica Neue" charset="0"/>
-              <a:cs typeface="Helvetica Neue" charset="0"/>
+            <a:endParaRPr lang="en-US" sz="7200" b="1" dirty="0">
+              <a:latin typeface="+mj-lt"/>
+              <a:ea typeface="Calibri" charset="0"/>
+              <a:cs typeface="Calibri" charset="0"/>
             </a:endParaRPr>
           </a:p>
         </p:txBody>
@@ -3610,14 +3610,14 @@
           <p:nvPr>
             <p:extLst>
               <p:ext uri="{D42A27DB-BD31-4B8C-83A1-F6EECF244321}">
-                <p14:modId xmlns:p14="http://schemas.microsoft.com/office/powerpoint/2010/main" val="41632834"/>
+                <p14:modId xmlns:p14="http://schemas.microsoft.com/office/powerpoint/2010/main" val="12759327"/>
               </p:ext>
             </p:extLst>
           </p:nvPr>
         </p:nvGraphicFramePr>
         <p:xfrm>
           <a:off x="520302" y="4597782"/>
-          <a:ext cx="20396598" cy="22013603"/>
+          <a:ext cx="20396598" cy="23748618"/>
         </p:xfrm>
         <a:graphic>
           <a:graphicData uri="http://schemas.openxmlformats.org/drawingml/2006/table">
@@ -3630,7 +3630,7 @@
                 <a:gridCol w="6798866"/>
                 <a:gridCol w="6798866"/>
               </a:tblGrid>
-              <a:tr h="22013603">
+              <a:tr h="23748618">
                 <a:tc>
                   <a:txBody>
                     <a:bodyPr/>
@@ -3743,8 +3743,8 @@
         </p:nvSpPr>
         <p:spPr>
           <a:xfrm>
-            <a:off x="520303" y="4686300"/>
-            <a:ext cx="6375797" cy="584775"/>
+            <a:off x="520300" y="4646941"/>
+            <a:ext cx="6375797" cy="646331"/>
           </a:xfrm>
           <a:prstGeom prst="rect">
             <a:avLst/>
@@ -3768,17 +3768,17 @@
           <a:p>
             <a:pPr algn="ctr"/>
             <a:r>
-              <a:rPr lang="en-US" sz="3200" b="1" dirty="0" smtClean="0">
-                <a:latin typeface="Helvetica Neue" charset="0"/>
-                <a:ea typeface="Helvetica Neue" charset="0"/>
-                <a:cs typeface="Helvetica Neue" charset="0"/>
+              <a:rPr lang="en-US" sz="3600" b="1" dirty="0" smtClean="0">
+                <a:latin typeface="Calibri" charset="0"/>
+                <a:ea typeface="Calibri" charset="0"/>
+                <a:cs typeface="Calibri" charset="0"/>
               </a:rPr>
-              <a:t>How was the Kingdom born?</a:t>
-            </a:r>
-            <a:endParaRPr lang="en-US" sz="3200" b="1" dirty="0">
-              <a:latin typeface="Helvetica Neue" charset="0"/>
-              <a:ea typeface="Helvetica Neue" charset="0"/>
-              <a:cs typeface="Helvetica Neue" charset="0"/>
+              <a:t>How did the Kingdom raise?</a:t>
+            </a:r>
+            <a:endParaRPr lang="en-US" sz="3600" b="1" dirty="0">
+              <a:latin typeface="Calibri" charset="0"/>
+              <a:ea typeface="Calibri" charset="0"/>
+              <a:cs typeface="Calibri" charset="0"/>
             </a:endParaRPr>
           </a:p>
         </p:txBody>
@@ -3791,8 +3791,8 @@
         </p:nvSpPr>
         <p:spPr>
           <a:xfrm>
-            <a:off x="520303" y="5606278"/>
-            <a:ext cx="6375797" cy="1682512"/>
+            <a:off x="520295" y="5551141"/>
+            <a:ext cx="6375799" cy="2733056"/>
           </a:xfrm>
           <a:prstGeom prst="rect">
             <a:avLst/>
@@ -3805,23 +3805,23 @@
           </a:bodyPr>
           <a:lstStyle/>
           <a:p>
-            <a:pPr algn="just">
+            <a:pPr>
               <a:lnSpc>
-                <a:spcPts val="3118"/>
+                <a:spcPct val="110000"/>
               </a:lnSpc>
             </a:pPr>
             <a:r>
-              <a:rPr lang="en-US" sz="2400" dirty="0" smtClean="0">
-                <a:latin typeface="Helvetica Neue" charset="0"/>
-                <a:ea typeface="Helvetica Neue" charset="0"/>
-                <a:cs typeface="Helvetica Neue" charset="0"/>
+              <a:rPr lang="en-US" sz="2600" dirty="0" smtClean="0">
+                <a:latin typeface="Calibri" charset="0"/>
+                <a:ea typeface="Calibri" charset="0"/>
+                <a:cs typeface="Calibri" charset="0"/>
               </a:rPr>
-              <a:t>King is a Swedish multinational company  founded in 2013 which has evolved throughout the years into one of the top mobile games development companies.</a:t>
-            </a:r>
-            <a:endParaRPr lang="en-US" sz="2400" dirty="0">
-              <a:latin typeface="Helvetica Neue" charset="0"/>
-              <a:ea typeface="Helvetica Neue" charset="0"/>
-              <a:cs typeface="Helvetica Neue" charset="0"/>
+              <a:t>King is a Swedish multinational company  founded in 2003 which has evolved throughout the years into one of the top mobile games development companies. It’s also one of the largest, having roughly 1400 employees.</a:t>
+            </a:r>
+            <a:endParaRPr lang="en-US" sz="2600" dirty="0">
+              <a:latin typeface="Calibri" charset="0"/>
+              <a:ea typeface="Calibri" charset="0"/>
+              <a:cs typeface="Calibri" charset="0"/>
             </a:endParaRPr>
           </a:p>
         </p:txBody>
@@ -3848,8 +3848,8 @@
         </p:blipFill>
         <p:spPr>
           <a:xfrm>
-            <a:off x="1257100" y="7426785"/>
-            <a:ext cx="4902200" cy="3263900"/>
+            <a:off x="1258979" y="8229399"/>
+            <a:ext cx="4584587" cy="3052432"/>
           </a:xfrm>
           <a:prstGeom prst="rect">
             <a:avLst/>
@@ -3864,8 +3864,8 @@
         </p:nvSpPr>
         <p:spPr>
           <a:xfrm>
-            <a:off x="520301" y="11057860"/>
-            <a:ext cx="6375799" cy="2477601"/>
+            <a:off x="520295" y="11464981"/>
+            <a:ext cx="6375799" cy="2733056"/>
           </a:xfrm>
           <a:prstGeom prst="rect">
             <a:avLst/>
@@ -3878,38 +3878,38 @@
           </a:bodyPr>
           <a:lstStyle/>
           <a:p>
-            <a:pPr algn="just">
+            <a:pPr>
               <a:lnSpc>
-                <a:spcPts val="3118"/>
+                <a:spcPct val="110000"/>
               </a:lnSpc>
             </a:pPr>
             <a:r>
-              <a:rPr lang="en-US" sz="2400" dirty="0" smtClean="0">
-                <a:latin typeface="Helvetica Neue" charset="0"/>
-                <a:ea typeface="Helvetica Neue" charset="0"/>
-                <a:cs typeface="Helvetica Neue" charset="0"/>
+              <a:rPr lang="en-US" sz="2600" dirty="0" smtClean="0">
+                <a:latin typeface="Calibri" charset="0"/>
+                <a:ea typeface="Calibri" charset="0"/>
+                <a:cs typeface="Calibri" charset="0"/>
               </a:rPr>
               <a:t>It has produced some of the top games on all mobile platforms including Candy Crush Saga which at its peak was played roughly by 100 million people around the globe. </a:t>
             </a:r>
           </a:p>
           <a:p>
-            <a:pPr algn="just">
+            <a:pPr>
               <a:lnSpc>
-                <a:spcPts val="3118"/>
+                <a:spcPct val="110000"/>
               </a:lnSpc>
             </a:pPr>
             <a:r>
-              <a:rPr lang="en-US" sz="2400" dirty="0" smtClean="0">
-                <a:latin typeface="Helvetica Neue" charset="0"/>
-                <a:ea typeface="Helvetica Neue" charset="0"/>
-                <a:cs typeface="Helvetica Neue" charset="0"/>
+              <a:rPr lang="en-US" sz="2600" dirty="0" smtClean="0">
+                <a:latin typeface="Calibri" charset="0"/>
+                <a:ea typeface="Calibri" charset="0"/>
+                <a:cs typeface="Calibri" charset="0"/>
               </a:rPr>
               <a:t>In February 2016, King was bought and merged into Activision Blizzard.</a:t>
             </a:r>
-            <a:endParaRPr lang="en-US" sz="2400" dirty="0">
-              <a:latin typeface="Helvetica Neue" charset="0"/>
-              <a:ea typeface="Helvetica Neue" charset="0"/>
-              <a:cs typeface="Helvetica Neue" charset="0"/>
+            <a:endParaRPr lang="en-US" sz="2600" dirty="0">
+              <a:latin typeface="Calibri" charset="0"/>
+              <a:ea typeface="Calibri" charset="0"/>
+              <a:cs typeface="Calibri" charset="0"/>
             </a:endParaRPr>
           </a:p>
         </p:txBody>
@@ -3922,8 +3922,8 @@
         </p:nvSpPr>
         <p:spPr>
           <a:xfrm>
-            <a:off x="520301" y="13898443"/>
-            <a:ext cx="6375797" cy="584775"/>
+            <a:off x="520297" y="14593667"/>
+            <a:ext cx="6375797" cy="646331"/>
           </a:xfrm>
           <a:prstGeom prst="rect">
             <a:avLst/>
@@ -3947,25 +3947,705 @@
           <a:p>
             <a:pPr algn="ctr"/>
             <a:r>
-              <a:rPr lang="en-US" sz="3200" b="1" dirty="0" smtClean="0">
+              <a:rPr lang="en-US" sz="3600" b="1" dirty="0" smtClean="0">
+                <a:latin typeface="Calibri" charset="0"/>
+                <a:ea typeface="Calibri" charset="0"/>
+                <a:cs typeface="Calibri" charset="0"/>
+              </a:rPr>
+              <a:t>My role as a </a:t>
+            </a:r>
+            <a:r>
+              <a:rPr lang="en-US" sz="3600" b="1" dirty="0" smtClean="0">
+                <a:latin typeface="Calibri" charset="0"/>
+                <a:ea typeface="Calibri" charset="0"/>
+                <a:cs typeface="Calibri" charset="0"/>
+              </a:rPr>
+              <a:t>Kingtern</a:t>
+            </a:r>
+            <a:endParaRPr lang="en-US" sz="3600" b="1" dirty="0">
+              <a:latin typeface="Calibri" charset="0"/>
+              <a:ea typeface="Calibri" charset="0"/>
+              <a:cs typeface="Calibri" charset="0"/>
+            </a:endParaRPr>
+          </a:p>
+        </p:txBody>
+      </p:sp>
+      <p:sp>
+        <p:nvSpPr>
+          <p:cNvPr id="32" name="TextBox 31"/>
+          <p:cNvSpPr txBox="1"/>
+          <p:nvPr/>
+        </p:nvSpPr>
+        <p:spPr>
+          <a:xfrm>
+            <a:off x="520299" y="15524813"/>
+            <a:ext cx="6375796" cy="12652694"/>
+          </a:xfrm>
+          <a:prstGeom prst="rect">
+            <a:avLst/>
+          </a:prstGeom>
+          <a:noFill/>
+        </p:spPr>
+        <p:txBody>
+          <a:bodyPr wrap="square" rtlCol="0">
+            <a:spAutoFit/>
+          </a:bodyPr>
+          <a:lstStyle/>
+          <a:p>
+            <a:pPr>
+              <a:lnSpc>
+                <a:spcPct val="110000"/>
+              </a:lnSpc>
+            </a:pPr>
+            <a:r>
+              <a:rPr lang="en-US" sz="2800" dirty="0">
+                <a:latin typeface="Calibri" charset="0"/>
+                <a:ea typeface="Calibri" charset="0"/>
+                <a:cs typeface="Calibri" charset="0"/>
+              </a:rPr>
+              <a:t>	</a:t>
+            </a:r>
+            <a:r>
+              <a:rPr lang="en-US" sz="2600" dirty="0" smtClean="0">
+                <a:latin typeface="Calibri" charset="0"/>
+                <a:ea typeface="Calibri" charset="0"/>
+                <a:cs typeface="Calibri" charset="0"/>
+              </a:rPr>
+              <a:t>       During my 	 	       placement, I was  	       part of the Gifting 	       team, which was 	       responsible for the 	       design, implementation and maintenance of the platform through which King players all around the globe receive gifts (e.g. gold bars, boosters). The whole team was based in the Barcelona office and I worked specifically on the interface through which we could launch fully-fledged gifting campaigns.</a:t>
+            </a:r>
+          </a:p>
+          <a:p>
+            <a:pPr>
+              <a:lnSpc>
+                <a:spcPct val="110000"/>
+              </a:lnSpc>
+            </a:pPr>
+            <a:endParaRPr lang="en-US" sz="2800" dirty="0">
+              <a:latin typeface="Calibri" charset="0"/>
+              <a:ea typeface="Calibri" charset="0"/>
+              <a:cs typeface="Calibri" charset="0"/>
+            </a:endParaRPr>
+          </a:p>
+          <a:p>
+            <a:pPr>
+              <a:lnSpc>
+                <a:spcPct val="110000"/>
+              </a:lnSpc>
+            </a:pPr>
+            <a:endParaRPr lang="en-US" sz="2800" dirty="0" smtClean="0">
+              <a:latin typeface="Calibri" charset="0"/>
+              <a:ea typeface="Calibri" charset="0"/>
+              <a:cs typeface="Calibri" charset="0"/>
+            </a:endParaRPr>
+          </a:p>
+          <a:p>
+            <a:pPr>
+              <a:lnSpc>
+                <a:spcPct val="110000"/>
+              </a:lnSpc>
+            </a:pPr>
+            <a:endParaRPr lang="en-US" sz="2800" dirty="0">
+              <a:latin typeface="Calibri" charset="0"/>
+              <a:ea typeface="Calibri" charset="0"/>
+              <a:cs typeface="Calibri" charset="0"/>
+            </a:endParaRPr>
+          </a:p>
+          <a:p>
+            <a:pPr>
+              <a:lnSpc>
+                <a:spcPct val="110000"/>
+              </a:lnSpc>
+            </a:pPr>
+            <a:endParaRPr lang="en-US" sz="2800" dirty="0" smtClean="0">
+              <a:latin typeface="Calibri" charset="0"/>
+              <a:ea typeface="Calibri" charset="0"/>
+              <a:cs typeface="Calibri" charset="0"/>
+            </a:endParaRPr>
+          </a:p>
+          <a:p>
+            <a:pPr>
+              <a:lnSpc>
+                <a:spcPct val="110000"/>
+              </a:lnSpc>
+            </a:pPr>
+            <a:endParaRPr lang="en-US" sz="2800" dirty="0">
+              <a:latin typeface="Calibri" charset="0"/>
+              <a:ea typeface="Calibri" charset="0"/>
+              <a:cs typeface="Calibri" charset="0"/>
+            </a:endParaRPr>
+          </a:p>
+          <a:p>
+            <a:pPr>
+              <a:lnSpc>
+                <a:spcPct val="110000"/>
+              </a:lnSpc>
+            </a:pPr>
+            <a:endParaRPr lang="en-US" sz="2800" dirty="0" smtClean="0">
+              <a:latin typeface="Calibri" charset="0"/>
+              <a:ea typeface="Calibri" charset="0"/>
+              <a:cs typeface="Calibri" charset="0"/>
+            </a:endParaRPr>
+          </a:p>
+          <a:p>
+            <a:pPr>
+              <a:lnSpc>
+                <a:spcPct val="110000"/>
+              </a:lnSpc>
+            </a:pPr>
+            <a:endParaRPr lang="en-US" sz="2600" dirty="0" smtClean="0">
+              <a:latin typeface="Calibri" charset="0"/>
+              <a:ea typeface="Calibri" charset="0"/>
+              <a:cs typeface="Calibri" charset="0"/>
+            </a:endParaRPr>
+          </a:p>
+          <a:p>
+            <a:pPr>
+              <a:lnSpc>
+                <a:spcPct val="110000"/>
+              </a:lnSpc>
+            </a:pPr>
+            <a:r>
+              <a:rPr lang="en-US" sz="2600" dirty="0" smtClean="0">
+                <a:latin typeface="Calibri" charset="0"/>
+                <a:ea typeface="Calibri" charset="0"/>
+                <a:cs typeface="Calibri" charset="0"/>
+              </a:rPr>
+              <a:t>I worked as a full-stack software engineer using various technologies. I implemented a very large number of features that were released into production, ranging from the availability to send gifts to specific platforms (e.g. iOS) to redesigning most of the user interface applying human computer interaction techniques.</a:t>
+            </a:r>
+            <a:endParaRPr lang="en-US" sz="2600" dirty="0">
+              <a:latin typeface="Calibri" charset="0"/>
+              <a:ea typeface="Calibri" charset="0"/>
+              <a:cs typeface="Calibri" charset="0"/>
+            </a:endParaRPr>
+          </a:p>
+        </p:txBody>
+      </p:sp>
+      <p:pic>
+        <p:nvPicPr>
+          <p:cNvPr id="34" name="Picture 33"/>
+          <p:cNvPicPr>
+            <a:picLocks noChangeAspect="1"/>
+          </p:cNvPicPr>
+          <p:nvPr/>
+        </p:nvPicPr>
+        <p:blipFill>
+          <a:blip r:embed="rId5">
+            <a:extLst>
+              <a:ext uri="{28A0092B-C50C-407E-A947-70E740481C1C}">
+                <a14:useLocalDpi xmlns:a14="http://schemas.microsoft.com/office/drawing/2010/main" val="0"/>
+              </a:ext>
+            </a:extLst>
+          </a:blip>
+          <a:stretch>
+            <a:fillRect/>
+          </a:stretch>
+        </p:blipFill>
+        <p:spPr>
+          <a:xfrm>
+            <a:off x="520299" y="15819463"/>
+            <a:ext cx="3030974" cy="2283113"/>
+          </a:xfrm>
+          <a:prstGeom prst="rect">
+            <a:avLst/>
+          </a:prstGeom>
+        </p:spPr>
+      </p:pic>
+      <p:sp>
+        <p:nvSpPr>
+          <p:cNvPr id="36" name="TextBox 35"/>
+          <p:cNvSpPr txBox="1"/>
+          <p:nvPr/>
+        </p:nvSpPr>
+        <p:spPr>
+          <a:xfrm>
+            <a:off x="520298" y="28747137"/>
+            <a:ext cx="5353837" cy="843436"/>
+          </a:xfrm>
+          <a:prstGeom prst="rect">
+            <a:avLst/>
+          </a:prstGeom>
+          <a:noFill/>
+        </p:spPr>
+        <p:txBody>
+          <a:bodyPr wrap="square" rtlCol="0">
+            <a:spAutoFit/>
+          </a:bodyPr>
+          <a:lstStyle/>
+          <a:p>
+            <a:r>
+              <a:rPr lang="en-US" dirty="0" smtClean="0">
                 <a:latin typeface="Helvetica Neue" charset="0"/>
                 <a:ea typeface="Helvetica Neue" charset="0"/>
                 <a:cs typeface="Helvetica Neue" charset="0"/>
               </a:rPr>
-              <a:t>My role as a </a:t>
-            </a:r>
-            <a:r>
-              <a:rPr lang="en-US" sz="3200" b="1" dirty="0" err="1" smtClean="0">
-                <a:latin typeface="Helvetica Neue" charset="0"/>
-                <a:ea typeface="Helvetica Neue" charset="0"/>
-                <a:cs typeface="Helvetica Neue" charset="0"/>
-              </a:rPr>
-              <a:t>Kingtern</a:t>
-            </a:r>
-            <a:endParaRPr lang="en-US" sz="3200" b="1" dirty="0">
+              <a:t>Technologies</a:t>
+            </a:r>
+            <a:endParaRPr lang="en-US" dirty="0">
               <a:latin typeface="Helvetica Neue" charset="0"/>
               <a:ea typeface="Helvetica Neue" charset="0"/>
               <a:cs typeface="Helvetica Neue" charset="0"/>
+            </a:endParaRPr>
+          </a:p>
+        </p:txBody>
+      </p:sp>
+      <p:pic>
+        <p:nvPicPr>
+          <p:cNvPr id="37" name="Picture 36"/>
+          <p:cNvPicPr>
+            <a:picLocks noChangeAspect="1"/>
+          </p:cNvPicPr>
+          <p:nvPr/>
+        </p:nvPicPr>
+        <p:blipFill>
+          <a:blip r:embed="rId6">
+            <a:extLst>
+              <a:ext uri="{28A0092B-C50C-407E-A947-70E740481C1C}">
+                <a14:useLocalDpi xmlns:a14="http://schemas.microsoft.com/office/drawing/2010/main" val="0"/>
+              </a:ext>
+            </a:extLst>
+          </a:blip>
+          <a:stretch>
+            <a:fillRect/>
+          </a:stretch>
+        </p:blipFill>
+        <p:spPr>
+          <a:xfrm>
+            <a:off x="1092296" y="21635152"/>
+            <a:ext cx="5231796" cy="2547721"/>
+          </a:xfrm>
+          <a:prstGeom prst="rect">
+            <a:avLst/>
+          </a:prstGeom>
+        </p:spPr>
+      </p:pic>
+      <p:sp>
+        <p:nvSpPr>
+          <p:cNvPr id="38" name="TextBox 37"/>
+          <p:cNvSpPr txBox="1"/>
+          <p:nvPr/>
+        </p:nvSpPr>
+        <p:spPr>
+          <a:xfrm>
+            <a:off x="7530701" y="4646941"/>
+            <a:ext cx="6375797" cy="646331"/>
+          </a:xfrm>
+          <a:prstGeom prst="rect">
+            <a:avLst/>
+          </a:prstGeom>
+          <a:solidFill>
+            <a:srgbClr val="FF8836"/>
+          </a:solidFill>
+          <a:effectLst>
+            <a:outerShdw blurRad="50800" dist="76200" dir="5400000" algn="t" rotWithShape="0">
+              <a:prstClr val="black">
+                <a:alpha val="40000"/>
+              </a:prstClr>
+            </a:outerShdw>
+          </a:effectLst>
+        </p:spPr>
+        <p:txBody>
+          <a:bodyPr wrap="square" rtlCol="0">
+            <a:spAutoFit/>
+          </a:bodyPr>
+          <a:lstStyle/>
+          <a:p>
+            <a:pPr algn="ctr"/>
+            <a:r>
+              <a:rPr lang="en-US" sz="3600" b="1" dirty="0" smtClean="0">
+                <a:latin typeface="Calibri" charset="0"/>
+                <a:ea typeface="Calibri" charset="0"/>
+                <a:cs typeface="Calibri" charset="0"/>
+              </a:rPr>
+              <a:t>Fast and Fluid</a:t>
+            </a:r>
+            <a:endParaRPr lang="en-US" sz="3600" b="1" dirty="0">
+              <a:latin typeface="Calibri" charset="0"/>
+              <a:ea typeface="Calibri" charset="0"/>
+              <a:cs typeface="Calibri" charset="0"/>
+            </a:endParaRPr>
+          </a:p>
+        </p:txBody>
+      </p:sp>
+      <p:sp>
+        <p:nvSpPr>
+          <p:cNvPr id="39" name="TextBox 38"/>
+          <p:cNvSpPr txBox="1"/>
+          <p:nvPr/>
+        </p:nvSpPr>
+        <p:spPr>
+          <a:xfrm>
+            <a:off x="7530699" y="5552087"/>
+            <a:ext cx="6375797" cy="2733056"/>
+          </a:xfrm>
+          <a:prstGeom prst="rect">
+            <a:avLst/>
+          </a:prstGeom>
+          <a:noFill/>
+        </p:spPr>
+        <p:txBody>
+          <a:bodyPr wrap="square" rtlCol="0">
+            <a:spAutoFit/>
+          </a:bodyPr>
+          <a:lstStyle/>
+          <a:p>
+            <a:pPr>
+              <a:lnSpc>
+                <a:spcPct val="110000"/>
+              </a:lnSpc>
+            </a:pPr>
+            <a:r>
+              <a:rPr lang="en-US" sz="2600" dirty="0" smtClean="0">
+                <a:latin typeface="Calibri" charset="0"/>
+                <a:ea typeface="Calibri" charset="0"/>
+                <a:cs typeface="Calibri" charset="0"/>
+              </a:rPr>
+              <a:t>Two of the core values of King, they represent the employee’s ability to adapt to any environment and do it quickly. </a:t>
+            </a:r>
+          </a:p>
+          <a:p>
+            <a:pPr>
+              <a:lnSpc>
+                <a:spcPct val="110000"/>
+              </a:lnSpc>
+            </a:pPr>
+            <a:r>
+              <a:rPr lang="en-US" sz="2600" dirty="0" smtClean="0">
+                <a:latin typeface="Calibri" charset="0"/>
+                <a:ea typeface="Calibri" charset="0"/>
+                <a:cs typeface="Calibri" charset="0"/>
+              </a:rPr>
+              <a:t>In my case, as a software engineer, that meant to work with agile methods and practices.</a:t>
+            </a:r>
+            <a:endParaRPr lang="en-US" sz="2600" dirty="0">
+              <a:latin typeface="Calibri" charset="0"/>
+              <a:ea typeface="Calibri" charset="0"/>
+              <a:cs typeface="Calibri" charset="0"/>
+            </a:endParaRPr>
+          </a:p>
+        </p:txBody>
+      </p:sp>
+      <p:pic>
+        <p:nvPicPr>
+          <p:cNvPr id="41" name="Picture 40"/>
+          <p:cNvPicPr>
+            <a:picLocks noChangeAspect="1"/>
+          </p:cNvPicPr>
+          <p:nvPr/>
+        </p:nvPicPr>
+        <p:blipFill>
+          <a:blip r:embed="rId7">
+            <a:extLst>
+              <a:ext uri="{28A0092B-C50C-407E-A947-70E740481C1C}">
+                <a14:useLocalDpi xmlns:a14="http://schemas.microsoft.com/office/drawing/2010/main" val="0"/>
+              </a:ext>
+            </a:extLst>
+          </a:blip>
+          <a:stretch>
+            <a:fillRect/>
+          </a:stretch>
+        </p:blipFill>
+        <p:spPr>
+          <a:xfrm>
+            <a:off x="8049927" y="8456732"/>
+            <a:ext cx="2349500" cy="1600200"/>
+          </a:xfrm>
+          <a:prstGeom prst="rect">
+            <a:avLst/>
+          </a:prstGeom>
+        </p:spPr>
+      </p:pic>
+      <p:pic>
+        <p:nvPicPr>
+          <p:cNvPr id="42" name="Picture 41"/>
+          <p:cNvPicPr>
+            <a:picLocks noChangeAspect="1"/>
+          </p:cNvPicPr>
+          <p:nvPr/>
+        </p:nvPicPr>
+        <p:blipFill>
+          <a:blip r:embed="rId8">
+            <a:extLst>
+              <a:ext uri="{28A0092B-C50C-407E-A947-70E740481C1C}">
+                <a14:useLocalDpi xmlns:a14="http://schemas.microsoft.com/office/drawing/2010/main" val="0"/>
+              </a:ext>
+            </a:extLst>
+          </a:blip>
+          <a:stretch>
+            <a:fillRect/>
+          </a:stretch>
+        </p:blipFill>
+        <p:spPr>
+          <a:xfrm>
+            <a:off x="10880002" y="8456731"/>
+            <a:ext cx="2105247" cy="1600201"/>
+          </a:xfrm>
+          <a:prstGeom prst="rect">
+            <a:avLst/>
+          </a:prstGeom>
+        </p:spPr>
+      </p:pic>
+      <p:sp>
+        <p:nvSpPr>
+          <p:cNvPr id="43" name="TextBox 42"/>
+          <p:cNvSpPr txBox="1"/>
+          <p:nvPr/>
+        </p:nvSpPr>
+        <p:spPr>
+          <a:xfrm>
+            <a:off x="7530699" y="10228521"/>
+            <a:ext cx="6375797" cy="8454622"/>
+          </a:xfrm>
+          <a:prstGeom prst="rect">
+            <a:avLst/>
+          </a:prstGeom>
+          <a:noFill/>
+        </p:spPr>
+        <p:txBody>
+          <a:bodyPr wrap="square" rtlCol="0">
+            <a:spAutoFit/>
+          </a:bodyPr>
+          <a:lstStyle/>
+          <a:p>
+            <a:pPr>
+              <a:lnSpc>
+                <a:spcPct val="110000"/>
+              </a:lnSpc>
+            </a:pPr>
+            <a:r>
+              <a:rPr lang="en-US" sz="2600" dirty="0" smtClean="0">
+                <a:latin typeface="Calibri" charset="0"/>
+                <a:ea typeface="Calibri" charset="0"/>
+                <a:cs typeface="Calibri" charset="0"/>
+              </a:rPr>
+              <a:t>At university I learned how to use SVN for version control, Trac for issue tracking and Jenkins for continuous integration. Even though at King I used either the same technologies or very similar ones (Git</a:t>
+            </a:r>
+            <a:r>
+              <a:rPr lang="en-US" sz="2600" dirty="0">
+                <a:latin typeface="Calibri" charset="0"/>
+                <a:ea typeface="Calibri" charset="0"/>
+                <a:cs typeface="Calibri" charset="0"/>
+              </a:rPr>
+              <a:t> </a:t>
+            </a:r>
+            <a:r>
+              <a:rPr lang="en-US" sz="2600" dirty="0" smtClean="0">
+                <a:latin typeface="Calibri" charset="0"/>
+                <a:ea typeface="Calibri" charset="0"/>
+                <a:cs typeface="Calibri" charset="0"/>
+              </a:rPr>
+              <a:t>for version control, JIRA for issue tracking and again Jenkins for CI), there were differences in scale, planning and organization </a:t>
+            </a:r>
+            <a:r>
+              <a:rPr lang="mr-IN" sz="2600" dirty="0" smtClean="0">
+                <a:latin typeface="Calibri" charset="0"/>
+                <a:ea typeface="Calibri" charset="0"/>
+                <a:cs typeface="Calibri" charset="0"/>
+              </a:rPr>
+              <a:t>–</a:t>
+            </a:r>
+            <a:r>
+              <a:rPr lang="en-US" sz="2600" dirty="0" smtClean="0">
+                <a:latin typeface="Calibri" charset="0"/>
+                <a:ea typeface="Calibri" charset="0"/>
+                <a:cs typeface="Calibri" charset="0"/>
+              </a:rPr>
+              <a:t> we had daily stand-ups were we discussed progress and next steps (instead of weekly ones at university), retrospectives every 2 months with people from other teams as well that could give insight into improving our product and working cycle (compared to more often ones in university group project) and ‘off-sites’ every month </a:t>
+            </a:r>
+            <a:r>
+              <a:rPr lang="mr-IN" sz="2600" dirty="0" smtClean="0">
+                <a:latin typeface="Calibri" charset="0"/>
+                <a:ea typeface="Calibri" charset="0"/>
+                <a:cs typeface="Calibri" charset="0"/>
+              </a:rPr>
+              <a:t>–</a:t>
+            </a:r>
+            <a:r>
+              <a:rPr lang="en-US" sz="2600" dirty="0" smtClean="0">
+                <a:latin typeface="Calibri" charset="0"/>
+                <a:ea typeface="Calibri" charset="0"/>
+                <a:cs typeface="Calibri" charset="0"/>
+              </a:rPr>
+              <a:t> these were fun gatherings of the team outside of the office were we could both bond and discuss what to do next at a much higher level.</a:t>
+            </a:r>
+          </a:p>
+        </p:txBody>
+      </p:sp>
+      <p:sp>
+        <p:nvSpPr>
+          <p:cNvPr id="44" name="TextBox 43"/>
+          <p:cNvSpPr txBox="1"/>
+          <p:nvPr/>
+        </p:nvSpPr>
+        <p:spPr>
+          <a:xfrm>
+            <a:off x="7530698" y="18771162"/>
+            <a:ext cx="6375797" cy="646331"/>
+          </a:xfrm>
+          <a:prstGeom prst="rect">
+            <a:avLst/>
+          </a:prstGeom>
+          <a:solidFill>
+            <a:srgbClr val="FF8836"/>
+          </a:solidFill>
+          <a:effectLst>
+            <a:outerShdw blurRad="50800" dist="76200" dir="5400000" algn="t" rotWithShape="0">
+              <a:prstClr val="black">
+                <a:alpha val="40000"/>
+              </a:prstClr>
+            </a:outerShdw>
+          </a:effectLst>
+        </p:spPr>
+        <p:txBody>
+          <a:bodyPr wrap="square" rtlCol="0">
+            <a:spAutoFit/>
+          </a:bodyPr>
+          <a:lstStyle/>
+          <a:p>
+            <a:pPr algn="ctr"/>
+            <a:r>
+              <a:rPr lang="en-US" sz="3600" b="1" dirty="0" smtClean="0">
+                <a:latin typeface="Calibri" charset="0"/>
+                <a:ea typeface="Calibri" charset="0"/>
+                <a:cs typeface="Calibri" charset="0"/>
+              </a:rPr>
+              <a:t>Humble and Open</a:t>
+            </a:r>
+            <a:endParaRPr lang="en-US" sz="3600" b="1" dirty="0">
+              <a:latin typeface="Calibri" charset="0"/>
+              <a:ea typeface="Calibri" charset="0"/>
+              <a:cs typeface="Calibri" charset="0"/>
+            </a:endParaRPr>
+          </a:p>
+        </p:txBody>
+      </p:sp>
+      <p:sp>
+        <p:nvSpPr>
+          <p:cNvPr id="46" name="TextBox 45"/>
+          <p:cNvSpPr txBox="1"/>
+          <p:nvPr/>
+        </p:nvSpPr>
+        <p:spPr>
+          <a:xfrm>
+            <a:off x="7468089" y="19811103"/>
+            <a:ext cx="6375797" cy="3173176"/>
+          </a:xfrm>
+          <a:prstGeom prst="rect">
+            <a:avLst/>
+          </a:prstGeom>
+          <a:noFill/>
+        </p:spPr>
+        <p:txBody>
+          <a:bodyPr wrap="square" rtlCol="0">
+            <a:spAutoFit/>
+          </a:bodyPr>
+          <a:lstStyle/>
+          <a:p>
+            <a:pPr>
+              <a:lnSpc>
+                <a:spcPct val="110000"/>
+              </a:lnSpc>
+            </a:pPr>
+            <a:r>
+              <a:rPr lang="en-US" sz="2600" dirty="0" smtClean="0">
+                <a:latin typeface="Calibri" charset="0"/>
+                <a:ea typeface="Calibri" charset="0"/>
+                <a:cs typeface="Calibri" charset="0"/>
+              </a:rPr>
+              <a:t>During my placement I reinforced the attitude the university taught me to adopt, which is to be modest, attentive to what others have to say, as well as communicative. However, the humble and open core value had one consequence at King </a:t>
+            </a:r>
+            <a:r>
+              <a:rPr lang="mr-IN" sz="2600" dirty="0" smtClean="0">
+                <a:latin typeface="Calibri" charset="0"/>
+                <a:ea typeface="Calibri" charset="0"/>
+                <a:cs typeface="Calibri" charset="0"/>
+              </a:rPr>
+              <a:t>–</a:t>
+            </a:r>
+            <a:r>
+              <a:rPr lang="en-US" sz="2600" dirty="0" smtClean="0">
+                <a:latin typeface="Calibri" charset="0"/>
+                <a:ea typeface="Calibri" charset="0"/>
+                <a:cs typeface="Calibri" charset="0"/>
+              </a:rPr>
+              <a:t> there was no source code documentation.</a:t>
+            </a:r>
+            <a:endParaRPr lang="en-US" sz="2600" dirty="0">
+              <a:latin typeface="Calibri" charset="0"/>
+              <a:ea typeface="Calibri" charset="0"/>
+              <a:cs typeface="Calibri" charset="0"/>
+            </a:endParaRPr>
+          </a:p>
+        </p:txBody>
+      </p:sp>
+      <p:pic>
+        <p:nvPicPr>
+          <p:cNvPr id="47" name="Picture 46"/>
+          <p:cNvPicPr>
+            <a:picLocks noChangeAspect="1"/>
+          </p:cNvPicPr>
+          <p:nvPr/>
+        </p:nvPicPr>
+        <p:blipFill>
+          <a:blip r:embed="rId9">
+            <a:extLst>
+              <a:ext uri="{28A0092B-C50C-407E-A947-70E740481C1C}">
+                <a14:useLocalDpi xmlns:a14="http://schemas.microsoft.com/office/drawing/2010/main" val="0"/>
+              </a:ext>
+            </a:extLst>
+          </a:blip>
+          <a:stretch>
+            <a:fillRect/>
+          </a:stretch>
+        </p:blipFill>
+        <p:spPr>
+          <a:xfrm>
+            <a:off x="8428018" y="22292057"/>
+            <a:ext cx="4451691" cy="3179779"/>
+          </a:xfrm>
+          <a:prstGeom prst="rect">
+            <a:avLst/>
+          </a:prstGeom>
+        </p:spPr>
+      </p:pic>
+      <p:sp>
+        <p:nvSpPr>
+          <p:cNvPr id="48" name="TextBox 47"/>
+          <p:cNvSpPr txBox="1"/>
+          <p:nvPr/>
+        </p:nvSpPr>
+        <p:spPr>
+          <a:xfrm>
+            <a:off x="7624965" y="25001004"/>
+            <a:ext cx="6187258" cy="3173176"/>
+          </a:xfrm>
+          <a:prstGeom prst="rect">
+            <a:avLst/>
+          </a:prstGeom>
+          <a:noFill/>
+        </p:spPr>
+        <p:txBody>
+          <a:bodyPr wrap="square" rtlCol="0">
+            <a:spAutoFit/>
+          </a:bodyPr>
+          <a:lstStyle/>
+          <a:p>
+            <a:pPr>
+              <a:lnSpc>
+                <a:spcPct val="110000"/>
+              </a:lnSpc>
+            </a:pPr>
+            <a:r>
+              <a:rPr lang="en-US" sz="2600" dirty="0" smtClean="0">
+                <a:latin typeface="Calibri" charset="0"/>
+                <a:ea typeface="Calibri" charset="0"/>
+                <a:cs typeface="Calibri" charset="0"/>
+              </a:rPr>
+              <a:t>Even though this promotes discussion among team members, one might forget after several months why that piece of code is there. Also, a new team member (which was my case as well) will ask many questions in the beginning in order to comprehend the code.</a:t>
+            </a:r>
+            <a:endParaRPr lang="en-US" sz="2600" dirty="0">
+              <a:latin typeface="Calibri" charset="0"/>
+              <a:ea typeface="Calibri" charset="0"/>
+              <a:cs typeface="Calibri" charset="0"/>
             </a:endParaRPr>
           </a:p>
         </p:txBody>

</xml_diff>

<commit_message>
Finished poster - now need to cut out words
</commit_message>
<xml_diff>
--- a/SESP/SESP-Poster.pptx
+++ b/SESP/SESP-Poster.pptx
@@ -3610,7 +3610,7 @@
           <p:nvPr>
             <p:extLst>
               <p:ext uri="{D42A27DB-BD31-4B8C-83A1-F6EECF244321}">
-                <p14:modId xmlns:p14="http://schemas.microsoft.com/office/powerpoint/2010/main" val="12759327"/>
+                <p14:modId xmlns:p14="http://schemas.microsoft.com/office/powerpoint/2010/main" val="1962862947"/>
               </p:ext>
             </p:extLst>
           </p:nvPr>
@@ -4173,15 +4173,15 @@
           <a:lstStyle/>
           <a:p>
             <a:r>
-              <a:rPr lang="en-US" dirty="0" smtClean="0">
-                <a:latin typeface="Helvetica Neue" charset="0"/>
+              <a:rPr lang="en-US" b="1" dirty="0" smtClean="0">
+                <a:latin typeface="+mj-lt"/>
                 <a:ea typeface="Helvetica Neue" charset="0"/>
                 <a:cs typeface="Helvetica Neue" charset="0"/>
               </a:rPr>
               <a:t>Technologies</a:t>
             </a:r>
-            <a:endParaRPr lang="en-US" dirty="0">
-              <a:latin typeface="Helvetica Neue" charset="0"/>
+            <a:endParaRPr lang="en-US" b="1" dirty="0">
+              <a:latin typeface="+mj-lt"/>
               <a:ea typeface="Helvetica Neue" charset="0"/>
               <a:cs typeface="Helvetica Neue" charset="0"/>
             </a:endParaRPr>
@@ -4478,7 +4478,7 @@
         </p:nvSpPr>
         <p:spPr>
           <a:xfrm>
-            <a:off x="7530698" y="18771162"/>
+            <a:off x="7514535" y="18732055"/>
             <a:ext cx="6375797" cy="646331"/>
           </a:xfrm>
           <a:prstGeom prst="rect">
@@ -4526,7 +4526,7 @@
         </p:nvSpPr>
         <p:spPr>
           <a:xfrm>
-            <a:off x="7468089" y="19811103"/>
+            <a:off x="7468089" y="19735836"/>
             <a:ext cx="6375797" cy="3173176"/>
           </a:xfrm>
           <a:prstGeom prst="rect">
@@ -4599,7 +4599,7 @@
         </p:blipFill>
         <p:spPr>
           <a:xfrm>
-            <a:off x="8428018" y="22292057"/>
+            <a:off x="8430141" y="22264006"/>
             <a:ext cx="4451691" cy="3179779"/>
           </a:xfrm>
           <a:prstGeom prst="rect">
@@ -4650,6 +4650,378 @@
           </a:p>
         </p:txBody>
       </p:sp>
+      <p:sp>
+        <p:nvSpPr>
+          <p:cNvPr id="49" name="TextBox 48"/>
+          <p:cNvSpPr txBox="1"/>
+          <p:nvPr/>
+        </p:nvSpPr>
+        <p:spPr>
+          <a:xfrm>
+            <a:off x="14541103" y="4646941"/>
+            <a:ext cx="6375797" cy="646331"/>
+          </a:xfrm>
+          <a:prstGeom prst="rect">
+            <a:avLst/>
+          </a:prstGeom>
+          <a:solidFill>
+            <a:srgbClr val="FF8836"/>
+          </a:solidFill>
+          <a:effectLst>
+            <a:outerShdw blurRad="50800" dist="76200" dir="5400000" algn="t" rotWithShape="0">
+              <a:prstClr val="black">
+                <a:alpha val="40000"/>
+              </a:prstClr>
+            </a:outerShdw>
+          </a:effectLst>
+        </p:spPr>
+        <p:txBody>
+          <a:bodyPr wrap="square" rtlCol="0">
+            <a:spAutoFit/>
+          </a:bodyPr>
+          <a:lstStyle/>
+          <a:p>
+            <a:pPr algn="ctr"/>
+            <a:r>
+              <a:rPr lang="en-US" sz="3600" b="1" dirty="0" smtClean="0">
+                <a:latin typeface="Calibri" charset="0"/>
+                <a:ea typeface="Calibri" charset="0"/>
+                <a:cs typeface="Calibri" charset="0"/>
+              </a:rPr>
+              <a:t>Craft and Care</a:t>
+            </a:r>
+            <a:endParaRPr lang="en-US" sz="3600" b="1" dirty="0">
+              <a:latin typeface="Calibri" charset="0"/>
+              <a:ea typeface="Calibri" charset="0"/>
+              <a:cs typeface="Calibri" charset="0"/>
+            </a:endParaRPr>
+          </a:p>
+        </p:txBody>
+      </p:sp>
+      <p:sp>
+        <p:nvSpPr>
+          <p:cNvPr id="50" name="TextBox 49"/>
+          <p:cNvSpPr txBox="1"/>
+          <p:nvPr/>
+        </p:nvSpPr>
+        <p:spPr>
+          <a:xfrm>
+            <a:off x="14541098" y="5594684"/>
+            <a:ext cx="3279066" cy="3613297"/>
+          </a:xfrm>
+          <a:prstGeom prst="rect">
+            <a:avLst/>
+          </a:prstGeom>
+          <a:noFill/>
+        </p:spPr>
+        <p:txBody>
+          <a:bodyPr wrap="square" rtlCol="0">
+            <a:spAutoFit/>
+          </a:bodyPr>
+          <a:lstStyle/>
+          <a:p>
+            <a:pPr>
+              <a:lnSpc>
+                <a:spcPct val="110000"/>
+              </a:lnSpc>
+            </a:pPr>
+            <a:r>
+              <a:rPr lang="en-US" sz="2600" dirty="0" smtClean="0">
+                <a:latin typeface="Calibri" charset="0"/>
+                <a:ea typeface="Calibri" charset="0"/>
+                <a:cs typeface="Calibri" charset="0"/>
+              </a:rPr>
+              <a:t>Quality Assurance and Quality Control are two of the most important features of a good software product. Having last year’s group project experience, I was able</a:t>
+            </a:r>
+            <a:endParaRPr lang="en-US" sz="2600" dirty="0">
+              <a:latin typeface="Calibri" charset="0"/>
+              <a:ea typeface="Calibri" charset="0"/>
+              <a:cs typeface="Calibri" charset="0"/>
+            </a:endParaRPr>
+          </a:p>
+        </p:txBody>
+      </p:sp>
+      <p:pic>
+        <p:nvPicPr>
+          <p:cNvPr id="51" name="Picture 50"/>
+          <p:cNvPicPr>
+            <a:picLocks noChangeAspect="1"/>
+          </p:cNvPicPr>
+          <p:nvPr/>
+        </p:nvPicPr>
+        <p:blipFill>
+          <a:blip r:embed="rId10">
+            <a:extLst>
+              <a:ext uri="{28A0092B-C50C-407E-A947-70E740481C1C}">
+                <a14:useLocalDpi xmlns:a14="http://schemas.microsoft.com/office/drawing/2010/main" val="0"/>
+              </a:ext>
+            </a:extLst>
+          </a:blip>
+          <a:stretch>
+            <a:fillRect/>
+          </a:stretch>
+        </p:blipFill>
+        <p:spPr>
+          <a:xfrm>
+            <a:off x="17820167" y="5551141"/>
+            <a:ext cx="3302000" cy="3289300"/>
+          </a:xfrm>
+          <a:prstGeom prst="rect">
+            <a:avLst/>
+          </a:prstGeom>
+        </p:spPr>
+      </p:pic>
+      <p:sp>
+        <p:nvSpPr>
+          <p:cNvPr id="52" name="TextBox 51"/>
+          <p:cNvSpPr txBox="1"/>
+          <p:nvPr/>
+        </p:nvSpPr>
+        <p:spPr>
+          <a:xfrm>
+            <a:off x="14541098" y="9083451"/>
+            <a:ext cx="6375802" cy="7574381"/>
+          </a:xfrm>
+          <a:prstGeom prst="rect">
+            <a:avLst/>
+          </a:prstGeom>
+          <a:noFill/>
+        </p:spPr>
+        <p:txBody>
+          <a:bodyPr wrap="square" rtlCol="0">
+            <a:spAutoFit/>
+          </a:bodyPr>
+          <a:lstStyle/>
+          <a:p>
+            <a:pPr>
+              <a:lnSpc>
+                <a:spcPct val="110000"/>
+              </a:lnSpc>
+            </a:pPr>
+            <a:r>
+              <a:rPr lang="en-US" sz="2600" dirty="0">
+                <a:latin typeface="Calibri" charset="0"/>
+                <a:ea typeface="Calibri" charset="0"/>
+                <a:cs typeface="Calibri" charset="0"/>
+              </a:rPr>
+              <a:t>t</a:t>
+            </a:r>
+            <a:r>
+              <a:rPr lang="en-US" sz="2600" dirty="0" smtClean="0">
+                <a:latin typeface="Calibri" charset="0"/>
+                <a:ea typeface="Calibri" charset="0"/>
+                <a:cs typeface="Calibri" charset="0"/>
+              </a:rPr>
+              <a:t>o apply my knowledge to ensure the Gifting product follows outstanding quality standards. Even though we did not follow Test Driven Development, I put in practice a variety of techniques including mutation, smoke and regression testing, checking for bad smells in the code and trying to discover best ways to refactor the code, as well as code coverage. I also used </a:t>
+            </a:r>
+            <a:r>
+              <a:rPr lang="en-US" sz="2600" dirty="0" err="1" smtClean="0">
+                <a:latin typeface="Calibri" charset="0"/>
+                <a:ea typeface="Calibri" charset="0"/>
+                <a:cs typeface="Calibri" charset="0"/>
+              </a:rPr>
+              <a:t>Mockito</a:t>
+            </a:r>
+            <a:r>
+              <a:rPr lang="en-US" sz="2600" dirty="0" smtClean="0">
+                <a:latin typeface="Calibri" charset="0"/>
+                <a:ea typeface="Calibri" charset="0"/>
+                <a:cs typeface="Calibri" charset="0"/>
+              </a:rPr>
+              <a:t> for mocking tests as it was widely used in the company </a:t>
+            </a:r>
+            <a:r>
+              <a:rPr lang="mr-IN" sz="2600" dirty="0" smtClean="0">
+                <a:latin typeface="Calibri" charset="0"/>
+                <a:ea typeface="Calibri" charset="0"/>
+                <a:cs typeface="Calibri" charset="0"/>
+              </a:rPr>
+              <a:t>–</a:t>
+            </a:r>
+            <a:r>
+              <a:rPr lang="en-US" sz="2600" dirty="0" smtClean="0">
+                <a:latin typeface="Calibri" charset="0"/>
+                <a:ea typeface="Calibri" charset="0"/>
+                <a:cs typeface="Calibri" charset="0"/>
+              </a:rPr>
+              <a:t> very effective, but might lead to overseeing lower-level bugs.</a:t>
+            </a:r>
+          </a:p>
+          <a:p>
+            <a:pPr>
+              <a:lnSpc>
+                <a:spcPct val="110000"/>
+              </a:lnSpc>
+            </a:pPr>
+            <a:r>
+              <a:rPr lang="en-US" sz="2600" dirty="0" smtClean="0">
+                <a:latin typeface="Calibri" charset="0"/>
+                <a:ea typeface="Calibri" charset="0"/>
+                <a:cs typeface="Calibri" charset="0"/>
+              </a:rPr>
+              <a:t>Quality Assurance was very promoted in the company, the Barcelona office organizing a weekly QA meeting where different teams came and discussed how they tried to improve their software quality.</a:t>
+            </a:r>
+            <a:endParaRPr lang="en-US" sz="2600" dirty="0">
+              <a:latin typeface="Calibri" charset="0"/>
+              <a:ea typeface="Calibri" charset="0"/>
+              <a:cs typeface="Calibri" charset="0"/>
+            </a:endParaRPr>
+          </a:p>
+        </p:txBody>
+      </p:sp>
+      <p:sp>
+        <p:nvSpPr>
+          <p:cNvPr id="53" name="TextBox 52"/>
+          <p:cNvSpPr txBox="1"/>
+          <p:nvPr/>
+        </p:nvSpPr>
+        <p:spPr>
+          <a:xfrm>
+            <a:off x="14493737" y="16758038"/>
+            <a:ext cx="6423156" cy="646331"/>
+          </a:xfrm>
+          <a:prstGeom prst="rect">
+            <a:avLst/>
+          </a:prstGeom>
+          <a:solidFill>
+            <a:srgbClr val="FF8836"/>
+          </a:solidFill>
+          <a:effectLst>
+            <a:outerShdw blurRad="50800" dist="76200" dir="5400000" algn="t" rotWithShape="0">
+              <a:prstClr val="black">
+                <a:alpha val="40000"/>
+              </a:prstClr>
+            </a:outerShdw>
+          </a:effectLst>
+        </p:spPr>
+        <p:txBody>
+          <a:bodyPr wrap="square" rtlCol="0">
+            <a:spAutoFit/>
+          </a:bodyPr>
+          <a:lstStyle/>
+          <a:p>
+            <a:pPr algn="ctr"/>
+            <a:r>
+              <a:rPr lang="en-US" sz="3600" b="1" dirty="0" smtClean="0">
+                <a:latin typeface="Calibri" charset="0"/>
+                <a:ea typeface="Calibri" charset="0"/>
+                <a:cs typeface="Calibri" charset="0"/>
+              </a:rPr>
+              <a:t>Sweetest and Bitterest Bits</a:t>
+            </a:r>
+            <a:endParaRPr lang="en-US" sz="3600" b="1" dirty="0">
+              <a:latin typeface="Calibri" charset="0"/>
+              <a:ea typeface="Calibri" charset="0"/>
+              <a:cs typeface="Calibri" charset="0"/>
+            </a:endParaRPr>
+          </a:p>
+        </p:txBody>
+      </p:sp>
+      <p:sp>
+        <p:nvSpPr>
+          <p:cNvPr id="54" name="TextBox 53"/>
+          <p:cNvSpPr txBox="1"/>
+          <p:nvPr/>
+        </p:nvSpPr>
+        <p:spPr>
+          <a:xfrm>
+            <a:off x="14541101" y="17700868"/>
+            <a:ext cx="6375795" cy="4493538"/>
+          </a:xfrm>
+          <a:prstGeom prst="rect">
+            <a:avLst/>
+          </a:prstGeom>
+          <a:noFill/>
+        </p:spPr>
+        <p:txBody>
+          <a:bodyPr wrap="square" rtlCol="0">
+            <a:spAutoFit/>
+          </a:bodyPr>
+          <a:lstStyle/>
+          <a:p>
+            <a:pPr>
+              <a:lnSpc>
+                <a:spcPct val="110000"/>
+              </a:lnSpc>
+            </a:pPr>
+            <a:r>
+              <a:rPr lang="en-US" sz="2600" dirty="0" smtClean="0">
+                <a:latin typeface="Calibri" charset="0"/>
+                <a:ea typeface="Calibri" charset="0"/>
+                <a:cs typeface="Calibri" charset="0"/>
+              </a:rPr>
+              <a:t>I believe this placement was an amazing experience and I would recommend it to anyone </a:t>
+            </a:r>
+            <a:r>
+              <a:rPr lang="mr-IN" sz="2600" dirty="0" smtClean="0">
+                <a:latin typeface="Calibri" charset="0"/>
+                <a:ea typeface="Calibri" charset="0"/>
+                <a:cs typeface="Calibri" charset="0"/>
+              </a:rPr>
+              <a:t>–</a:t>
+            </a:r>
+            <a:r>
+              <a:rPr lang="en-US" sz="2600" dirty="0" smtClean="0">
+                <a:latin typeface="Calibri" charset="0"/>
+                <a:ea typeface="Calibri" charset="0"/>
+                <a:cs typeface="Calibri" charset="0"/>
+              </a:rPr>
+              <a:t> I learned most how to be a good team player, how to communicate effectively, how to ensure my code and software practices are outstanding. However, the fact that the internship </a:t>
+            </a:r>
+            <a:r>
+              <a:rPr lang="en-US" sz="2600" dirty="0" err="1" smtClean="0">
+                <a:latin typeface="Calibri" charset="0"/>
+                <a:ea typeface="Calibri" charset="0"/>
+                <a:cs typeface="Calibri" charset="0"/>
+              </a:rPr>
+              <a:t>programme</a:t>
+            </a:r>
+            <a:r>
+              <a:rPr lang="en-US" sz="2600" dirty="0" smtClean="0">
+                <a:latin typeface="Calibri" charset="0"/>
+                <a:ea typeface="Calibri" charset="0"/>
+                <a:cs typeface="Calibri" charset="0"/>
+              </a:rPr>
+              <a:t> at King is at the beginning, there is no guaranteed continuity and this could definitely be improved during the following years.</a:t>
+            </a:r>
+            <a:endParaRPr lang="en-US" sz="2600" dirty="0">
+              <a:latin typeface="Calibri" charset="0"/>
+              <a:ea typeface="Calibri" charset="0"/>
+              <a:cs typeface="Calibri" charset="0"/>
+            </a:endParaRPr>
+          </a:p>
+        </p:txBody>
+      </p:sp>
+      <p:pic>
+        <p:nvPicPr>
+          <p:cNvPr id="55" name="Picture 54"/>
+          <p:cNvPicPr>
+            <a:picLocks noChangeAspect="1"/>
+          </p:cNvPicPr>
+          <p:nvPr/>
+        </p:nvPicPr>
+        <p:blipFill>
+          <a:blip r:embed="rId11">
+            <a:extLst>
+              <a:ext uri="{28A0092B-C50C-407E-A947-70E740481C1C}">
+                <a14:useLocalDpi xmlns:a14="http://schemas.microsoft.com/office/drawing/2010/main" val="0"/>
+              </a:ext>
+            </a:extLst>
+          </a:blip>
+          <a:stretch>
+            <a:fillRect/>
+          </a:stretch>
+        </p:blipFill>
+        <p:spPr>
+          <a:xfrm>
+            <a:off x="15503190" y="22895934"/>
+            <a:ext cx="3722742" cy="3215890"/>
+          </a:xfrm>
+          <a:prstGeom prst="rect">
+            <a:avLst/>
+          </a:prstGeom>
+        </p:spPr>
+      </p:pic>
     </p:spTree>
     <p:extLst>
       <p:ext uri="{BB962C8B-B14F-4D97-AF65-F5344CB8AC3E}">

</xml_diff>